<commit_message>
updated plots and cleaned up code in nhung version of notebook
</commit_message>
<xml_diff>
--- a/Figures_6884.pptx
+++ b/Figures_6884.pptx
@@ -125,7 +125,7 @@
 </file>
 
 <file path=ppt/charts/chart1.xml><?xml version="1.0" encoding="utf-8"?>
-<c:chartSpace xmlns:c="http://schemas.openxmlformats.org/drawingml/2006/chart" xmlns:a="http://schemas.openxmlformats.org/drawingml/2006/main" xmlns:r="http://schemas.openxmlformats.org/officeDocument/2006/relationships" xmlns:c16r2="http://schemas.microsoft.com/office/drawing/2015/06/chart">
+<c:chartSpace xmlns:c="http://schemas.openxmlformats.org/drawingml/2006/chart" xmlns:a="http://schemas.openxmlformats.org/drawingml/2006/main" xmlns:r="http://schemas.openxmlformats.org/officeDocument/2006/relationships">
   <c:date1904 val="0"/>
   <c:lang val="en-US"/>
   <c:roundedCorners val="0"/>
@@ -185,8 +185,8 @@
         <c:manualLayout>
           <c:xMode val="edge"/>
           <c:yMode val="edge"/>
-          <c:x val="0.24654141172579599"/>
-          <c:y val="4.6296202070056303E-2"/>
+          <c:x val="0.246541411725796"/>
+          <c:y val="0.0462962020700563"/>
         </c:manualLayout>
       </c:layout>
       <c:overlay val="0"/>
@@ -312,36 +312,36 @@
                 <c:formatCode>General</c:formatCode>
                 <c:ptCount val="9"/>
                 <c:pt idx="0">
-                  <c:v>2450</c:v>
+                  <c:v>2450.0</c:v>
                 </c:pt>
                 <c:pt idx="1">
-                  <c:v>4350</c:v>
+                  <c:v>4350.0</c:v>
                 </c:pt>
                 <c:pt idx="2">
-                  <c:v>7404</c:v>
+                  <c:v>7404.0</c:v>
                 </c:pt>
                 <c:pt idx="3">
-                  <c:v>12364</c:v>
+                  <c:v>12364.0</c:v>
                 </c:pt>
                 <c:pt idx="4">
-                  <c:v>14045</c:v>
+                  <c:v>14045.0</c:v>
                 </c:pt>
                 <c:pt idx="5">
-                  <c:v>13041</c:v>
+                  <c:v>13041.0</c:v>
                 </c:pt>
                 <c:pt idx="6">
-                  <c:v>9786</c:v>
+                  <c:v>9786.0</c:v>
                 </c:pt>
                 <c:pt idx="7">
-                  <c:v>2540</c:v>
+                  <c:v>2540.0</c:v>
                 </c:pt>
                 <c:pt idx="8">
-                  <c:v>68</c:v>
+                  <c:v>68.0</c:v>
                 </c:pt>
               </c:numCache>
             </c:numRef>
           </c:val>
-          <c:extLst>
+          <c:extLst xmlns:c16r2="http://schemas.microsoft.com/office/drawing/2015/06/chart">
             <c:ext xmlns:c16="http://schemas.microsoft.com/office/drawing/2014/chart" uri="{C3380CC4-5D6E-409C-BE32-E72D297353CC}">
               <c16:uniqueId val="{00000000-8971-4F38-932A-9100264206FE}"/>
             </c:ext>
@@ -357,11 +357,11 @@
         </c:dLbls>
         <c:gapWidth val="219"/>
         <c:overlap val="-27"/>
-        <c:axId val="2143052016"/>
-        <c:axId val="2141214064"/>
+        <c:axId val="-2129222496"/>
+        <c:axId val="-2114521376"/>
       </c:barChart>
       <c:catAx>
-        <c:axId val="2143052016"/>
+        <c:axId val="-2129222496"/>
         <c:scaling>
           <c:orientation val="minMax"/>
         </c:scaling>
@@ -464,7 +464,7 @@
             <a:endParaRPr lang="en-US"/>
           </a:p>
         </c:txPr>
-        <c:crossAx val="2141214064"/>
+        <c:crossAx val="-2114521376"/>
         <c:crosses val="autoZero"/>
         <c:auto val="1"/>
         <c:lblAlgn val="ctr"/>
@@ -472,7 +472,7 @@
         <c:noMultiLvlLbl val="0"/>
       </c:catAx>
       <c:valAx>
-        <c:axId val="2141214064"/>
+        <c:axId val="-2114521376"/>
         <c:scaling>
           <c:orientation val="minMax"/>
         </c:scaling>
@@ -583,7 +583,7 @@
             <a:endParaRPr lang="en-US"/>
           </a:p>
         </c:txPr>
-        <c:crossAx val="2143052016"/>
+        <c:crossAx val="-2129222496"/>
         <c:crosses val="autoZero"/>
         <c:crossBetween val="between"/>
       </c:valAx>
@@ -630,7 +630,7 @@
 </file>
 
 <file path=ppt/charts/chart2.xml><?xml version="1.0" encoding="utf-8"?>
-<c:chartSpace xmlns:c="http://schemas.openxmlformats.org/drawingml/2006/chart" xmlns:a="http://schemas.openxmlformats.org/drawingml/2006/main" xmlns:r="http://schemas.openxmlformats.org/officeDocument/2006/relationships" xmlns:c16r2="http://schemas.microsoft.com/office/drawing/2015/06/chart">
+<c:chartSpace xmlns:c="http://schemas.openxmlformats.org/drawingml/2006/chart" xmlns:a="http://schemas.openxmlformats.org/drawingml/2006/main" xmlns:r="http://schemas.openxmlformats.org/officeDocument/2006/relationships">
   <c:date1904 val="0"/>
   <c:lang val="en-US"/>
   <c:roundedCorners val="0"/>
@@ -650,7 +650,7 @@
           <a:lstStyle/>
           <a:p>
             <a:pPr>
-              <a:defRPr sz="2600" b="1" i="0" u="none" strike="noStrike" kern="1200" spc="0" baseline="0">
+              <a:defRPr sz="2600" b="0" i="0" u="none" strike="noStrike" kern="1200" spc="0" baseline="0">
                 <a:solidFill>
                   <a:schemeClr val="tx1">
                     <a:lumMod val="65000"/>
@@ -663,7 +663,7 @@
               </a:defRPr>
             </a:pPr>
             <a:r>
-              <a:rPr lang="en-US" sz="2600" b="1">
+              <a:rPr lang="en-US" sz="2600">
                 <a:latin typeface="Times New Roman" charset="0"/>
                 <a:ea typeface="Times New Roman" charset="0"/>
                 <a:cs typeface="Times New Roman" charset="0"/>
@@ -673,6 +673,7 @@
           </a:p>
         </c:rich>
       </c:tx>
+      <c:layout/>
       <c:overlay val="0"/>
       <c:spPr>
         <a:noFill/>
@@ -686,7 +687,7 @@
         <a:lstStyle/>
         <a:p>
           <a:pPr>
-            <a:defRPr sz="2600" b="1" i="0" u="none" strike="noStrike" kern="1200" spc="0" baseline="0">
+            <a:defRPr sz="2600" b="0" i="0" u="none" strike="noStrike" kern="1200" spc="0" baseline="0">
               <a:solidFill>
                 <a:schemeClr val="tx1">
                   <a:lumMod val="65000"/>
@@ -705,23 +706,33 @@
     <c:autoTitleDeleted val="0"/>
     <c:plotArea>
       <c:layout/>
-      <c:lineChart>
-        <c:grouping val="standard"/>
+      <c:scatterChart>
+        <c:scatterStyle val="lineMarker"/>
         <c:varyColors val="0"/>
         <c:ser>
           <c:idx val="0"/>
           <c:order val="0"/>
           <c:spPr>
-            <a:ln w="28575" cap="rnd">
-              <a:solidFill>
-                <a:schemeClr val="accent1"/>
-              </a:solidFill>
+            <a:ln w="25400" cap="rnd">
+              <a:noFill/>
               <a:round/>
             </a:ln>
             <a:effectLst/>
           </c:spPr>
           <c:marker>
-            <c:symbol val="none"/>
+            <c:symbol val="circle"/>
+            <c:size val="5"/>
+            <c:spPr>
+              <a:solidFill>
+                <a:schemeClr val="accent1"/>
+              </a:solidFill>
+              <a:ln w="9525">
+                <a:solidFill>
+                  <a:schemeClr val="accent1"/>
+                </a:solidFill>
+              </a:ln>
+              <a:effectLst/>
+            </c:spPr>
           </c:marker>
           <c:trendline>
             <c:spPr>
@@ -740,8 +751,8 @@
             <c:trendlineLbl>
               <c:layout>
                 <c:manualLayout>
-                  <c:x val="3.4911710148241702E-2"/>
-                  <c:y val="-8.8082747053067997E-2"/>
+                  <c:x val="0.117618092420356"/>
+                  <c:y val="-0.0864997903368588"/>
                 </c:manualLayout>
               </c:layout>
               <c:numFmt formatCode="General" sourceLinked="0"/>
@@ -774,7 +785,7 @@
               </c:txPr>
             </c:trendlineLbl>
           </c:trendline>
-          <c:cat>
+          <c:xVal>
             <c:strRef>
               <c:f>'tPA Admin-Month'!$A$5:$A$16</c:f>
               <c:strCache>
@@ -817,56 +828,56 @@
                 </c:pt>
               </c:strCache>
             </c:strRef>
-          </c:cat>
-          <c:val>
+          </c:xVal>
+          <c:yVal>
             <c:numRef>
               <c:f>'tPA Admin-Month'!$U$5:$U$16</c:f>
               <c:numCache>
                 <c:formatCode>General</c:formatCode>
                 <c:ptCount val="12"/>
                 <c:pt idx="0">
-                  <c:v>577</c:v>
+                  <c:v>577.0</c:v>
                 </c:pt>
                 <c:pt idx="1">
-                  <c:v>311</c:v>
+                  <c:v>311.0</c:v>
                 </c:pt>
                 <c:pt idx="2">
-                  <c:v>362</c:v>
+                  <c:v>362.0</c:v>
                 </c:pt>
                 <c:pt idx="3">
-                  <c:v>358</c:v>
+                  <c:v>358.0</c:v>
                 </c:pt>
                 <c:pt idx="4">
-                  <c:v>379</c:v>
+                  <c:v>379.0</c:v>
                 </c:pt>
                 <c:pt idx="5">
-                  <c:v>373</c:v>
+                  <c:v>373.0</c:v>
                 </c:pt>
                 <c:pt idx="6">
-                  <c:v>552</c:v>
+                  <c:v>552.0</c:v>
                 </c:pt>
                 <c:pt idx="7">
-                  <c:v>584</c:v>
+                  <c:v>584.0</c:v>
                 </c:pt>
                 <c:pt idx="8">
-                  <c:v>523</c:v>
+                  <c:v>523.0</c:v>
                 </c:pt>
                 <c:pt idx="9">
-                  <c:v>546</c:v>
+                  <c:v>546.0</c:v>
                 </c:pt>
                 <c:pt idx="10">
-                  <c:v>588</c:v>
+                  <c:v>588.0</c:v>
                 </c:pt>
                 <c:pt idx="11">
-                  <c:v>593</c:v>
+                  <c:v>593.0</c:v>
                 </c:pt>
               </c:numCache>
             </c:numRef>
-          </c:val>
+          </c:yVal>
           <c:smooth val="0"/>
-          <c:extLst>
+          <c:extLst xmlns:c16r2="http://schemas.microsoft.com/office/drawing/2015/06/chart">
             <c:ext xmlns:c16="http://schemas.microsoft.com/office/drawing/2014/chart" uri="{C3380CC4-5D6E-409C-BE32-E72D297353CC}">
-              <c16:uniqueId val="{00000000-272D-485D-BA96-9BE6B734E4D4}"/>
+              <c16:uniqueId val="{00000000-F42B-4DB9-B841-D495B6D9F47F}"/>
             </c:ext>
           </c:extLst>
         </c:ser>
@@ -878,26 +889,11 @@
           <c:showPercent val="0"/>
           <c:showBubbleSize val="0"/>
         </c:dLbls>
-        <c:hiLowLines>
-          <c:spPr>
-            <a:ln w="9525" cap="flat" cmpd="sng" algn="ctr">
-              <a:solidFill>
-                <a:schemeClr val="tx1">
-                  <a:lumMod val="75000"/>
-                  <a:lumOff val="25000"/>
-                </a:schemeClr>
-              </a:solidFill>
-              <a:round/>
-            </a:ln>
-            <a:effectLst/>
-          </c:spPr>
-        </c:hiLowLines>
-        <c:smooth val="0"/>
-        <c:axId val="2143856720"/>
-        <c:axId val="2143862672"/>
-      </c:lineChart>
-      <c:catAx>
-        <c:axId val="2143856720"/>
+        <c:axId val="-2067932544"/>
+        <c:axId val="-2068047744"/>
+      </c:scatterChart>
+      <c:valAx>
+        <c:axId val="-2067932544"/>
         <c:scaling>
           <c:orientation val="minMax"/>
         </c:scaling>
@@ -933,6 +929,7 @@
               </a:p>
             </c:rich>
           </c:tx>
+          <c:layout/>
           <c:overlay val="0"/>
           <c:spPr>
             <a:noFill/>
@@ -999,15 +996,12 @@
             <a:endParaRPr lang="en-US"/>
           </a:p>
         </c:txPr>
-        <c:crossAx val="2143862672"/>
+        <c:crossAx val="-2068047744"/>
         <c:crosses val="autoZero"/>
-        <c:auto val="1"/>
-        <c:lblAlgn val="ctr"/>
-        <c:lblOffset val="100"/>
-        <c:noMultiLvlLbl val="0"/>
-      </c:catAx>
+        <c:crossBetween val="midCat"/>
+      </c:valAx>
       <c:valAx>
-        <c:axId val="2143862672"/>
+        <c:axId val="-2068047744"/>
         <c:scaling>
           <c:orientation val="minMax"/>
         </c:scaling>
@@ -1070,6 +1064,7 @@
               </a:p>
             </c:rich>
           </c:tx>
+          <c:layout/>
           <c:overlay val="0"/>
           <c:spPr>
             <a:noFill/>
@@ -1130,9 +1125,9 @@
             <a:endParaRPr lang="en-US"/>
           </a:p>
         </c:txPr>
-        <c:crossAx val="2143856720"/>
+        <c:crossAx val="-2067932544"/>
         <c:crosses val="autoZero"/>
-        <c:crossBetween val="between"/>
+        <c:crossBetween val="midCat"/>
       </c:valAx>
       <c:spPr>
         <a:noFill/>
@@ -1177,7 +1172,7 @@
 </file>
 
 <file path=ppt/charts/chart3.xml><?xml version="1.0" encoding="utf-8"?>
-<c:chartSpace xmlns:c="http://schemas.openxmlformats.org/drawingml/2006/chart" xmlns:a="http://schemas.openxmlformats.org/drawingml/2006/main" xmlns:r="http://schemas.openxmlformats.org/officeDocument/2006/relationships" xmlns:c16r2="http://schemas.microsoft.com/office/drawing/2015/06/chart">
+<c:chartSpace xmlns:c="http://schemas.openxmlformats.org/drawingml/2006/chart" xmlns:a="http://schemas.openxmlformats.org/drawingml/2006/main" xmlns:r="http://schemas.openxmlformats.org/officeDocument/2006/relationships">
   <c:date1904 val="0"/>
   <c:lang val="en-US"/>
   <c:roundedCorners val="0"/>
@@ -1233,6 +1228,7 @@
           </a:p>
         </c:rich>
       </c:tx>
+      <c:layout/>
       <c:overlay val="0"/>
       <c:spPr>
         <a:noFill/>
@@ -1485,102 +1481,102 @@
                 <c:formatCode>General</c:formatCode>
                 <c:ptCount val="31"/>
                 <c:pt idx="0">
-                  <c:v>5008</c:v>
+                  <c:v>5008.0</c:v>
                 </c:pt>
                 <c:pt idx="1">
-                  <c:v>6261</c:v>
+                  <c:v>6261.0</c:v>
                 </c:pt>
                 <c:pt idx="2">
-                  <c:v>9649</c:v>
+                  <c:v>9649.0</c:v>
                 </c:pt>
                 <c:pt idx="3">
-                  <c:v>159</c:v>
+                  <c:v>159.0</c:v>
                 </c:pt>
                 <c:pt idx="4">
-                  <c:v>10245</c:v>
+                  <c:v>10245.0</c:v>
                 </c:pt>
                 <c:pt idx="5">
-                  <c:v>3910</c:v>
+                  <c:v>3910.0</c:v>
                 </c:pt>
                 <c:pt idx="6">
-                  <c:v>879</c:v>
+                  <c:v>879.0</c:v>
                 </c:pt>
                 <c:pt idx="7">
-                  <c:v>131</c:v>
+                  <c:v>131.0</c:v>
                 </c:pt>
                 <c:pt idx="8">
-                  <c:v>900</c:v>
+                  <c:v>900.0</c:v>
                 </c:pt>
                 <c:pt idx="9">
-                  <c:v>1244</c:v>
+                  <c:v>1244.0</c:v>
                 </c:pt>
                 <c:pt idx="10">
-                  <c:v>121</c:v>
+                  <c:v>121.0</c:v>
                 </c:pt>
                 <c:pt idx="11">
-                  <c:v>3805</c:v>
+                  <c:v>3805.0</c:v>
                 </c:pt>
                 <c:pt idx="12">
-                  <c:v>837</c:v>
+                  <c:v>837.0</c:v>
                 </c:pt>
                 <c:pt idx="13">
-                  <c:v>531</c:v>
+                  <c:v>531.0</c:v>
                 </c:pt>
                 <c:pt idx="14">
-                  <c:v>1223</c:v>
+                  <c:v>1223.0</c:v>
                 </c:pt>
                 <c:pt idx="15">
-                  <c:v>7380</c:v>
+                  <c:v>7380.0</c:v>
                 </c:pt>
                 <c:pt idx="16">
-                  <c:v>159</c:v>
+                  <c:v>159.0</c:v>
                 </c:pt>
                 <c:pt idx="17">
-                  <c:v>7363</c:v>
+                  <c:v>7363.0</c:v>
                 </c:pt>
                 <c:pt idx="18">
-                  <c:v>751</c:v>
+                  <c:v>751.0</c:v>
                 </c:pt>
                 <c:pt idx="19">
-                  <c:v>6733</c:v>
+                  <c:v>6733.0</c:v>
                 </c:pt>
                 <c:pt idx="20">
-                  <c:v>1</c:v>
+                  <c:v>1.0</c:v>
                 </c:pt>
                 <c:pt idx="21">
-                  <c:v>72</c:v>
+                  <c:v>72.0</c:v>
                 </c:pt>
                 <c:pt idx="22">
-                  <c:v>2247</c:v>
+                  <c:v>2247.0</c:v>
                 </c:pt>
                 <c:pt idx="23">
-                  <c:v>1427</c:v>
+                  <c:v>1427.0</c:v>
                 </c:pt>
                 <c:pt idx="24">
-                  <c:v>4793</c:v>
+                  <c:v>4793.0</c:v>
                 </c:pt>
                 <c:pt idx="25">
-                  <c:v>2964</c:v>
+                  <c:v>2964.0</c:v>
                 </c:pt>
                 <c:pt idx="26">
-                  <c:v>13985</c:v>
+                  <c:v>13985.0</c:v>
                 </c:pt>
                 <c:pt idx="27">
-                  <c:v>3670</c:v>
+                  <c:v>3670.0</c:v>
                 </c:pt>
                 <c:pt idx="28">
-                  <c:v>303</c:v>
+                  <c:v>303.0</c:v>
                 </c:pt>
                 <c:pt idx="29">
-                  <c:v>442</c:v>
+                  <c:v>442.0</c:v>
                 </c:pt>
                 <c:pt idx="30">
-                  <c:v>399</c:v>
+                  <c:v>399.0</c:v>
                 </c:pt>
               </c:numCache>
             </c:numRef>
           </c:val>
-          <c:extLst>
+          <c:extLst xmlns:c16r2="http://schemas.microsoft.com/office/drawing/2015/06/chart">
             <c:ext xmlns:c16="http://schemas.microsoft.com/office/drawing/2014/chart" uri="{C3380CC4-5D6E-409C-BE32-E72D297353CC}">
               <c16:uniqueId val="{00000000-9E1F-40B5-A8A0-963142D0B221}"/>
             </c:ext>
@@ -1595,11 +1591,11 @@
           <c:showBubbleSize val="0"/>
         </c:dLbls>
         <c:gapWidth val="150"/>
-        <c:axId val="2143915376"/>
-        <c:axId val="2143921872"/>
+        <c:axId val="-2125056336"/>
+        <c:axId val="-2124551072"/>
       </c:barChart>
       <c:catAx>
-        <c:axId val="2143915376"/>
+        <c:axId val="-2125056336"/>
         <c:scaling>
           <c:orientation val="minMax"/>
         </c:scaling>
@@ -1648,6 +1644,7 @@
               </a:p>
             </c:rich>
           </c:tx>
+          <c:layout/>
           <c:overlay val="0"/>
           <c:spPr>
             <a:noFill/>
@@ -1714,7 +1711,7 @@
             <a:endParaRPr lang="en-US"/>
           </a:p>
         </c:txPr>
-        <c:crossAx val="2143921872"/>
+        <c:crossAx val="-2124551072"/>
         <c:crosses val="autoZero"/>
         <c:auto val="1"/>
         <c:lblAlgn val="ctr"/>
@@ -1722,7 +1719,7 @@
         <c:noMultiLvlLbl val="0"/>
       </c:catAx>
       <c:valAx>
-        <c:axId val="2143921872"/>
+        <c:axId val="-2124551072"/>
         <c:scaling>
           <c:orientation val="minMax"/>
         </c:scaling>
@@ -1772,6 +1769,7 @@
               </a:p>
             </c:rich>
           </c:tx>
+          <c:layout/>
           <c:overlay val="0"/>
           <c:spPr>
             <a:noFill/>
@@ -1832,7 +1830,7 @@
             <a:endParaRPr lang="en-US"/>
           </a:p>
         </c:txPr>
-        <c:crossAx val="2143915376"/>
+        <c:crossAx val="-2125056336"/>
         <c:crosses val="autoZero"/>
         <c:crossBetween val="between"/>
       </c:valAx>
@@ -1876,7 +1874,7 @@
 </file>
 
 <file path=ppt/charts/chart4.xml><?xml version="1.0" encoding="utf-8"?>
-<c:chartSpace xmlns:c="http://schemas.openxmlformats.org/drawingml/2006/chart" xmlns:a="http://schemas.openxmlformats.org/drawingml/2006/main" xmlns:r="http://schemas.openxmlformats.org/officeDocument/2006/relationships" xmlns:c16r2="http://schemas.microsoft.com/office/drawing/2015/06/chart">
+<c:chartSpace xmlns:c="http://schemas.openxmlformats.org/drawingml/2006/chart" xmlns:a="http://schemas.openxmlformats.org/drawingml/2006/main" xmlns:r="http://schemas.openxmlformats.org/officeDocument/2006/relationships">
   <c:date1904 val="0"/>
   <c:lang val="en-US"/>
   <c:roundedCorners val="0"/>
@@ -1919,6 +1917,7 @@
           </a:p>
         </c:rich>
       </c:tx>
+      <c:layout/>
       <c:overlay val="0"/>
       <c:spPr>
         <a:noFill/>
@@ -2077,84 +2076,84 @@
                 <c:formatCode>General</c:formatCode>
                 <c:ptCount val="26"/>
                 <c:pt idx="0">
-                  <c:v>157</c:v>
+                  <c:v>157.0</c:v>
                 </c:pt>
                 <c:pt idx="1">
-                  <c:v>1094</c:v>
+                  <c:v>1094.0</c:v>
                 </c:pt>
                 <c:pt idx="2">
-                  <c:v>506</c:v>
+                  <c:v>506.0</c:v>
                 </c:pt>
                 <c:pt idx="3">
-                  <c:v>8555</c:v>
+                  <c:v>8555.0</c:v>
                 </c:pt>
                 <c:pt idx="4">
-                  <c:v>1</c:v>
+                  <c:v>1.0</c:v>
                 </c:pt>
                 <c:pt idx="5">
-                  <c:v>521</c:v>
+                  <c:v>521.0</c:v>
                 </c:pt>
                 <c:pt idx="6">
-                  <c:v>1421</c:v>
+                  <c:v>1421.0</c:v>
                 </c:pt>
                 <c:pt idx="7">
-                  <c:v>1</c:v>
+                  <c:v>1.0</c:v>
                 </c:pt>
                 <c:pt idx="8">
-                  <c:v>4102</c:v>
+                  <c:v>4102.0</c:v>
                 </c:pt>
                 <c:pt idx="9">
-                  <c:v>5132</c:v>
+                  <c:v>5132.0</c:v>
                 </c:pt>
                 <c:pt idx="10">
-                  <c:v>1472</c:v>
+                  <c:v>1472.0</c:v>
                 </c:pt>
                 <c:pt idx="11">
-                  <c:v>133</c:v>
+                  <c:v>133.0</c:v>
                 </c:pt>
                 <c:pt idx="12">
-                  <c:v>7363</c:v>
+                  <c:v>7363.0</c:v>
                 </c:pt>
                 <c:pt idx="13">
-                  <c:v>1</c:v>
+                  <c:v>1.0</c:v>
                 </c:pt>
                 <c:pt idx="14">
-                  <c:v>225</c:v>
+                  <c:v>225.0</c:v>
                 </c:pt>
                 <c:pt idx="15">
-                  <c:v>1</c:v>
+                  <c:v>1.0</c:v>
                 </c:pt>
                 <c:pt idx="16">
-                  <c:v>30928</c:v>
+                  <c:v>30928.0</c:v>
                 </c:pt>
                 <c:pt idx="17">
-                  <c:v>2276</c:v>
+                  <c:v>2276.0</c:v>
                 </c:pt>
                 <c:pt idx="18">
-                  <c:v>12620</c:v>
+                  <c:v>12620.0</c:v>
                 </c:pt>
                 <c:pt idx="19">
-                  <c:v>5746</c:v>
+                  <c:v>5746.0</c:v>
                 </c:pt>
                 <c:pt idx="20">
-                  <c:v>1</c:v>
+                  <c:v>1.0</c:v>
                 </c:pt>
                 <c:pt idx="21">
-                  <c:v>721</c:v>
+                  <c:v>721.0</c:v>
                 </c:pt>
                 <c:pt idx="22">
-                  <c:v>190</c:v>
+                  <c:v>190.0</c:v>
                 </c:pt>
                 <c:pt idx="23">
-                  <c:v>434</c:v>
+                  <c:v>434.0</c:v>
                 </c:pt>
                 <c:pt idx="24">
-                  <c:v>1610</c:v>
+                  <c:v>1610.0</c:v>
                 </c:pt>
               </c:numCache>
             </c:numRef>
           </c:val>
-          <c:extLst>
+          <c:extLst xmlns:c16r2="http://schemas.microsoft.com/office/drawing/2015/06/chart">
             <c:ext xmlns:c16="http://schemas.microsoft.com/office/drawing/2014/chart" uri="{C3380CC4-5D6E-409C-BE32-E72D297353CC}">
               <c16:uniqueId val="{00000000-97BB-458A-95B6-6374C976489E}"/>
             </c:ext>
@@ -2170,11 +2169,11 @@
         </c:dLbls>
         <c:gapWidth val="219"/>
         <c:overlap val="-27"/>
-        <c:axId val="2144470560"/>
-        <c:axId val="2144477056"/>
+        <c:axId val="-2131019120"/>
+        <c:axId val="-2131012624"/>
       </c:barChart>
       <c:catAx>
-        <c:axId val="2144470560"/>
+        <c:axId val="-2131019120"/>
         <c:scaling>
           <c:orientation val="minMax"/>
         </c:scaling>
@@ -2227,8 +2226,8 @@
             <c:manualLayout>
               <c:xMode val="edge"/>
               <c:yMode val="edge"/>
-              <c:x val="0.43762095953719699"/>
-              <c:y val="0.83466210086774995"/>
+              <c:x val="0.437620959537197"/>
+              <c:y val="0.83466210086775"/>
             </c:manualLayout>
           </c:layout>
           <c:overlay val="0"/>
@@ -2297,7 +2296,7 @@
             <a:endParaRPr lang="en-US"/>
           </a:p>
         </c:txPr>
-        <c:crossAx val="2144477056"/>
+        <c:crossAx val="-2131012624"/>
         <c:crosses val="autoZero"/>
         <c:auto val="1"/>
         <c:lblAlgn val="ctr"/>
@@ -2305,7 +2304,7 @@
         <c:noMultiLvlLbl val="0"/>
       </c:catAx>
       <c:valAx>
-        <c:axId val="2144477056"/>
+        <c:axId val="-2131012624"/>
         <c:scaling>
           <c:orientation val="minMax"/>
         </c:scaling>
@@ -2372,7 +2371,7 @@
             <c:manualLayout>
               <c:xMode val="edge"/>
               <c:yMode val="edge"/>
-              <c:x val="1.47084659114598E-2"/>
+              <c:x val="0.0147084659114598"/>
               <c:y val="0.1806246531365"/>
             </c:manualLayout>
           </c:layout>
@@ -2436,7 +2435,7 @@
             <a:endParaRPr lang="en-US"/>
           </a:p>
         </c:txPr>
-        <c:crossAx val="2144470560"/>
+        <c:crossAx val="-2131019120"/>
         <c:crosses val="autoZero"/>
         <c:crossBetween val="between"/>
       </c:valAx>
@@ -2480,7 +2479,7 @@
 </file>
 
 <file path=ppt/charts/chart5.xml><?xml version="1.0" encoding="utf-8"?>
-<c:chartSpace xmlns:c="http://schemas.openxmlformats.org/drawingml/2006/chart" xmlns:a="http://schemas.openxmlformats.org/drawingml/2006/main" xmlns:r="http://schemas.openxmlformats.org/officeDocument/2006/relationships" xmlns:c16r2="http://schemas.microsoft.com/office/drawing/2015/06/chart">
+<c:chartSpace xmlns:c="http://schemas.openxmlformats.org/drawingml/2006/chart" xmlns:a="http://schemas.openxmlformats.org/drawingml/2006/main" xmlns:r="http://schemas.openxmlformats.org/officeDocument/2006/relationships">
   <c:date1904 val="0"/>
   <c:lang val="en-US"/>
   <c:roundedCorners val="0"/>
@@ -2628,37 +2627,37 @@
                 <c:formatCode>General</c:formatCode>
                 <c:ptCount val="9"/>
                 <c:pt idx="0">
-                  <c:v>40</c:v>
+                  <c:v>40.0</c:v>
                 </c:pt>
                 <c:pt idx="1">
-                  <c:v>134</c:v>
+                  <c:v>134.0</c:v>
                 </c:pt>
                 <c:pt idx="2">
-                  <c:v>353</c:v>
+                  <c:v>353.0</c:v>
                 </c:pt>
                 <c:pt idx="3">
-                  <c:v>667</c:v>
+                  <c:v>667.0</c:v>
                 </c:pt>
                 <c:pt idx="4">
-                  <c:v>807</c:v>
+                  <c:v>807.0</c:v>
                 </c:pt>
                 <c:pt idx="5">
-                  <c:v>791</c:v>
+                  <c:v>791.0</c:v>
                 </c:pt>
                 <c:pt idx="6">
-                  <c:v>648</c:v>
+                  <c:v>648.0</c:v>
                 </c:pt>
                 <c:pt idx="7">
-                  <c:v>209</c:v>
+                  <c:v>209.0</c:v>
                 </c:pt>
                 <c:pt idx="8">
-                  <c:v>4</c:v>
+                  <c:v>4.0</c:v>
                 </c:pt>
               </c:numCache>
             </c:numRef>
           </c:val>
           <c:smooth val="0"/>
-          <c:extLst>
+          <c:extLst xmlns:c16r2="http://schemas.microsoft.com/office/drawing/2015/06/chart">
             <c:ext xmlns:c16="http://schemas.microsoft.com/office/drawing/2014/chart" uri="{C3380CC4-5D6E-409C-BE32-E72D297353CC}">
               <c16:uniqueId val="{00000000-E5AC-4FBF-A13B-1871786F110B}"/>
             </c:ext>
@@ -2687,11 +2686,11 @@
           </c:spPr>
         </c:hiLowLines>
         <c:smooth val="0"/>
-        <c:axId val="-2135495536"/>
-        <c:axId val="-2132963840"/>
+        <c:axId val="-2086076832"/>
+        <c:axId val="-2086070784"/>
       </c:lineChart>
       <c:catAx>
-        <c:axId val="-2135495536"/>
+        <c:axId val="-2086076832"/>
         <c:scaling>
           <c:orientation val="minMax"/>
         </c:scaling>
@@ -2793,7 +2792,7 @@
             <a:endParaRPr lang="en-US"/>
           </a:p>
         </c:txPr>
-        <c:crossAx val="-2132963840"/>
+        <c:crossAx val="-2086070784"/>
         <c:crosses val="autoZero"/>
         <c:auto val="1"/>
         <c:lblAlgn val="ctr"/>
@@ -2801,7 +2800,7 @@
         <c:noMultiLvlLbl val="0"/>
       </c:catAx>
       <c:valAx>
-        <c:axId val="-2132963840"/>
+        <c:axId val="-2086070784"/>
         <c:scaling>
           <c:orientation val="minMax"/>
         </c:scaling>
@@ -2911,7 +2910,7 @@
             <a:endParaRPr lang="en-US"/>
           </a:p>
         </c:txPr>
-        <c:crossAx val="-2135495536"/>
+        <c:crossAx val="-2086076832"/>
         <c:crosses val="autoZero"/>
         <c:crossBetween val="between"/>
       </c:valAx>
@@ -2955,7 +2954,7 @@
 </file>
 
 <file path=ppt/charts/chart6.xml><?xml version="1.0" encoding="utf-8"?>
-<c:chartSpace xmlns:c="http://schemas.openxmlformats.org/drawingml/2006/chart" xmlns:a="http://schemas.openxmlformats.org/drawingml/2006/main" xmlns:r="http://schemas.openxmlformats.org/officeDocument/2006/relationships" xmlns:c16r2="http://schemas.microsoft.com/office/drawing/2015/06/chart">
+<c:chartSpace xmlns:c="http://schemas.openxmlformats.org/drawingml/2006/chart" xmlns:a="http://schemas.openxmlformats.org/drawingml/2006/main" xmlns:r="http://schemas.openxmlformats.org/officeDocument/2006/relationships">
   <c:date1904 val="0"/>
   <c:lang val="en-US"/>
   <c:roundedCorners val="0"/>
@@ -3184,93 +3183,93 @@
                 <c:formatCode>General</c:formatCode>
                 <c:ptCount val="31"/>
                 <c:pt idx="0">
-                  <c:v>294</c:v>
+                  <c:v>294.0</c:v>
                 </c:pt>
                 <c:pt idx="1">
-                  <c:v>378</c:v>
+                  <c:v>378.0</c:v>
                 </c:pt>
                 <c:pt idx="2">
-                  <c:v>406</c:v>
+                  <c:v>406.0</c:v>
                 </c:pt>
                 <c:pt idx="3">
-                  <c:v>8</c:v>
+                  <c:v>8.0</c:v>
                 </c:pt>
                 <c:pt idx="4">
-                  <c:v>589</c:v>
+                  <c:v>589.0</c:v>
                 </c:pt>
                 <c:pt idx="5">
-                  <c:v>145</c:v>
+                  <c:v>145.0</c:v>
                 </c:pt>
                 <c:pt idx="6">
-                  <c:v>33</c:v>
+                  <c:v>33.0</c:v>
                 </c:pt>
                 <c:pt idx="8">
-                  <c:v>120</c:v>
+                  <c:v>120.0</c:v>
                 </c:pt>
                 <c:pt idx="9">
-                  <c:v>22</c:v>
+                  <c:v>22.0</c:v>
                 </c:pt>
                 <c:pt idx="10">
-                  <c:v>10</c:v>
+                  <c:v>10.0</c:v>
                 </c:pt>
                 <c:pt idx="11">
-                  <c:v>177</c:v>
+                  <c:v>177.0</c:v>
                 </c:pt>
                 <c:pt idx="12">
-                  <c:v>40</c:v>
+                  <c:v>40.0</c:v>
                 </c:pt>
                 <c:pt idx="13">
-                  <c:v>13</c:v>
+                  <c:v>13.0</c:v>
                 </c:pt>
                 <c:pt idx="14">
-                  <c:v>95</c:v>
+                  <c:v>95.0</c:v>
                 </c:pt>
                 <c:pt idx="15">
-                  <c:v>495</c:v>
+                  <c:v>495.0</c:v>
                 </c:pt>
                 <c:pt idx="16">
-                  <c:v>7</c:v>
+                  <c:v>7.0</c:v>
                 </c:pt>
                 <c:pt idx="17">
-                  <c:v>555</c:v>
+                  <c:v>555.0</c:v>
                 </c:pt>
                 <c:pt idx="18">
-                  <c:v>30</c:v>
+                  <c:v>30.0</c:v>
                 </c:pt>
                 <c:pt idx="19">
-                  <c:v>188</c:v>
+                  <c:v>188.0</c:v>
                 </c:pt>
                 <c:pt idx="22">
-                  <c:v>165</c:v>
+                  <c:v>165.0</c:v>
                 </c:pt>
                 <c:pt idx="23">
-                  <c:v>38</c:v>
+                  <c:v>38.0</c:v>
                 </c:pt>
                 <c:pt idx="24">
-                  <c:v>379</c:v>
+                  <c:v>379.0</c:v>
                 </c:pt>
                 <c:pt idx="25">
-                  <c:v>235</c:v>
+                  <c:v>235.0</c:v>
                 </c:pt>
                 <c:pt idx="26">
-                  <c:v>1042</c:v>
+                  <c:v>1042.0</c:v>
                 </c:pt>
                 <c:pt idx="27">
-                  <c:v>187</c:v>
+                  <c:v>187.0</c:v>
                 </c:pt>
                 <c:pt idx="28">
-                  <c:v>17</c:v>
+                  <c:v>17.0</c:v>
                 </c:pt>
                 <c:pt idx="29">
-                  <c:v>64</c:v>
+                  <c:v>64.0</c:v>
                 </c:pt>
                 <c:pt idx="30">
-                  <c:v>14</c:v>
+                  <c:v>14.0</c:v>
                 </c:pt>
               </c:numCache>
             </c:numRef>
           </c:val>
-          <c:extLst>
+          <c:extLst xmlns:c16r2="http://schemas.microsoft.com/office/drawing/2015/06/chart">
             <c:ext xmlns:c16="http://schemas.microsoft.com/office/drawing/2014/chart" uri="{C3380CC4-5D6E-409C-BE32-E72D297353CC}">
               <c16:uniqueId val="{00000000-3F3C-40AF-84E3-BED8832E3F42}"/>
             </c:ext>
@@ -3285,11 +3284,11 @@
           <c:showBubbleSize val="0"/>
         </c:dLbls>
         <c:gapWidth val="150"/>
-        <c:axId val="-2133693072"/>
-        <c:axId val="-2133584928"/>
+        <c:axId val="-2086137008"/>
+        <c:axId val="-2086107840"/>
       </c:barChart>
       <c:catAx>
-        <c:axId val="-2133693072"/>
+        <c:axId val="-2086137008"/>
         <c:scaling>
           <c:orientation val="minMax"/>
         </c:scaling>
@@ -3404,7 +3403,7 @@
             <a:endParaRPr lang="en-US"/>
           </a:p>
         </c:txPr>
-        <c:crossAx val="-2133584928"/>
+        <c:crossAx val="-2086107840"/>
         <c:crosses val="autoZero"/>
         <c:auto val="1"/>
         <c:lblAlgn val="ctr"/>
@@ -3412,7 +3411,7 @@
         <c:noMultiLvlLbl val="0"/>
       </c:catAx>
       <c:valAx>
-        <c:axId val="-2133584928"/>
+        <c:axId val="-2086107840"/>
         <c:scaling>
           <c:orientation val="minMax"/>
         </c:scaling>
@@ -3551,7 +3550,7 @@
             <a:endParaRPr lang="en-US"/>
           </a:p>
         </c:txPr>
-        <c:crossAx val="-2133693072"/>
+        <c:crossAx val="-2086137008"/>
         <c:crosses val="autoZero"/>
         <c:crossBetween val="between"/>
       </c:valAx>
@@ -3595,7 +3594,7 @@
 </file>
 
 <file path=ppt/charts/chart7.xml><?xml version="1.0" encoding="utf-8"?>
-<c:chartSpace xmlns:c="http://schemas.openxmlformats.org/drawingml/2006/chart" xmlns:a="http://schemas.openxmlformats.org/drawingml/2006/main" xmlns:r="http://schemas.openxmlformats.org/officeDocument/2006/relationships" xmlns:c16r2="http://schemas.microsoft.com/office/drawing/2015/06/chart">
+<c:chartSpace xmlns:c="http://schemas.openxmlformats.org/drawingml/2006/chart" xmlns:a="http://schemas.openxmlformats.org/drawingml/2006/main" xmlns:r="http://schemas.openxmlformats.org/officeDocument/2006/relationships">
   <c:date1904 val="0"/>
   <c:lang val="en-US"/>
   <c:roundedCorners val="0"/>
@@ -3668,7 +3667,6 @@
           </a:p>
         </c:rich>
       </c:tx>
-      <c:layout/>
       <c:overlay val="0"/>
       <c:spPr>
         <a:noFill/>
@@ -3924,46 +3922,46 @@
                 <c:formatCode>General</c:formatCode>
                 <c:ptCount val="33"/>
                 <c:pt idx="0">
-                  <c:v>6.1249999999999991</c:v>
+                  <c:v>6.124999999999997</c:v>
                 </c:pt>
                 <c:pt idx="1">
                   <c:v>25.2</c:v>
                 </c:pt>
                 <c:pt idx="2">
-                  <c:v>11.941176470588241</c:v>
+                  <c:v>11.94117647058824</c:v>
                 </c:pt>
                 <c:pt idx="3">
-                  <c:v>2</c:v>
+                  <c:v>2.0</c:v>
                 </c:pt>
                 <c:pt idx="4">
-                  <c:v>9.8166666666666682</c:v>
+                  <c:v>9.81666666666667</c:v>
                 </c:pt>
                 <c:pt idx="5">
-                  <c:v>6.9047619047619051</c:v>
+                  <c:v>6.904761904761905</c:v>
                 </c:pt>
                 <c:pt idx="6">
-                  <c:v>4.7142857142857126</c:v>
+                  <c:v>4.714285714285712</c:v>
                 </c:pt>
                 <c:pt idx="7">
-                  <c:v>0</c:v>
+                  <c:v>0.0</c:v>
                 </c:pt>
                 <c:pt idx="8">
-                  <c:v>20</c:v>
+                  <c:v>20.0</c:v>
                 </c:pt>
                 <c:pt idx="9">
-                  <c:v>22</c:v>
+                  <c:v>22.0</c:v>
                 </c:pt>
                 <c:pt idx="10">
-                  <c:v>1.4285714285714299</c:v>
+                  <c:v>1.42857142857143</c:v>
                 </c:pt>
                 <c:pt idx="11">
                   <c:v>44.25</c:v>
                 </c:pt>
                 <c:pt idx="12">
-                  <c:v>3.6363636363636358</c:v>
+                  <c:v>3.636363636363635</c:v>
                 </c:pt>
                 <c:pt idx="13">
-                  <c:v>13</c:v>
+                  <c:v>13.0</c:v>
                 </c:pt>
                 <c:pt idx="14">
                   <c:v>47.5</c:v>
@@ -3972,10 +3970,10 @@
                   <c:v>24.75</c:v>
                 </c:pt>
                 <c:pt idx="16">
-                  <c:v>0.31818181818181801</c:v>
+                  <c:v>0.318181818181818</c:v>
                 </c:pt>
                 <c:pt idx="17">
-                  <c:v>278</c:v>
+                  <c:v>278.0</c:v>
                 </c:pt>
                 <c:pt idx="18">
                   <c:v>7.5</c:v>
@@ -3984,48 +3982,48 @@
                   <c:v>11.75</c:v>
                 </c:pt>
                 <c:pt idx="20">
-                  <c:v>0</c:v>
+                  <c:v>0.0</c:v>
                 </c:pt>
                 <c:pt idx="21">
-                  <c:v>0</c:v>
+                  <c:v>0.0</c:v>
                 </c:pt>
                 <c:pt idx="22">
-                  <c:v>165</c:v>
+                  <c:v>165.0</c:v>
                 </c:pt>
                 <c:pt idx="23">
                   <c:v>9.5</c:v>
                 </c:pt>
                 <c:pt idx="24">
-                  <c:v>25.266666666666669</c:v>
+                  <c:v>25.26666666666667</c:v>
                 </c:pt>
                 <c:pt idx="25">
-                  <c:v>78.333333333333314</c:v>
+                  <c:v>78.3333333333333</c:v>
                 </c:pt>
                 <c:pt idx="26">
-                  <c:v>69.466666666666654</c:v>
+                  <c:v>69.46666666666666</c:v>
                 </c:pt>
                 <c:pt idx="27">
-                  <c:v>26.714285714285712</c:v>
+                  <c:v>26.71428571428572</c:v>
                 </c:pt>
                 <c:pt idx="28">
-                  <c:v>0.45945945945945899</c:v>
+                  <c:v>0.459459459459459</c:v>
                 </c:pt>
                 <c:pt idx="29">
-                  <c:v>5.8181818181818166</c:v>
+                  <c:v>5.818181818181816</c:v>
                 </c:pt>
                 <c:pt idx="30">
                   <c:v>2.8</c:v>
                 </c:pt>
                 <c:pt idx="31">
-                  <c:v>0</c:v>
+                  <c:v>0.0</c:v>
                 </c:pt>
                 <c:pt idx="32">
-                  <c:v>0</c:v>
+                  <c:v>0.0</c:v>
                 </c:pt>
               </c:numCache>
             </c:numRef>
           </c:val>
-          <c:extLst>
+          <c:extLst xmlns:c16r2="http://schemas.microsoft.com/office/drawing/2015/06/chart">
             <c:ext xmlns:c16="http://schemas.microsoft.com/office/drawing/2014/chart" uri="{C3380CC4-5D6E-409C-BE32-E72D297353CC}">
               <c16:uniqueId val="{00000000-CDAB-41AC-9B70-EC3DE25FE14F}"/>
             </c:ext>
@@ -4041,11 +4039,11 @@
         </c:dLbls>
         <c:gapWidth val="219"/>
         <c:overlap val="-27"/>
-        <c:axId val="-2139049616"/>
-        <c:axId val="2144367952"/>
+        <c:axId val="-2116101024"/>
+        <c:axId val="-2116094912"/>
       </c:barChart>
       <c:catAx>
-        <c:axId val="-2139049616"/>
+        <c:axId val="-2116101024"/>
         <c:scaling>
           <c:orientation val="minMax"/>
         </c:scaling>
@@ -4081,7 +4079,6 @@
               </a:p>
             </c:rich>
           </c:tx>
-          <c:layout/>
           <c:overlay val="0"/>
           <c:spPr>
             <a:noFill/>
@@ -4148,7 +4145,7 @@
             <a:endParaRPr lang="en-US"/>
           </a:p>
         </c:txPr>
-        <c:crossAx val="2144367952"/>
+        <c:crossAx val="-2116094912"/>
         <c:crosses val="autoZero"/>
         <c:auto val="1"/>
         <c:lblAlgn val="ctr"/>
@@ -4156,7 +4153,7 @@
         <c:noMultiLvlLbl val="0"/>
       </c:catAx>
       <c:valAx>
-        <c:axId val="2144367952"/>
+        <c:axId val="-2116094912"/>
         <c:scaling>
           <c:orientation val="minMax"/>
         </c:scaling>
@@ -4206,7 +4203,6 @@
               </a:p>
             </c:rich>
           </c:tx>
-          <c:layout/>
           <c:overlay val="0"/>
           <c:spPr>
             <a:noFill/>
@@ -4267,7 +4263,7 @@
             <a:endParaRPr lang="en-US"/>
           </a:p>
         </c:txPr>
-        <c:crossAx val="-2139049616"/>
+        <c:crossAx val="-2116101024"/>
         <c:crosses val="autoZero"/>
         <c:crossBetween val="between"/>
       </c:valAx>
@@ -8219,7 +8215,7 @@
           <a:p>
             <a:fld id="{3DAF4512-571F-2547-8FAE-8CE7BD99AD3A}" type="datetimeFigureOut">
               <a:rPr lang="en-US" smtClean="0"/>
-              <a:t>5/17/2018</a:t>
+              <a:t>4/12/20</a:t>
             </a:fld>
             <a:endParaRPr lang="en-US"/>
           </a:p>
@@ -9568,7 +9564,7 @@
           <a:p>
             <a:fld id="{12E6D096-BE3D-0644-9615-A52293DE42F9}" type="datetimeFigureOut">
               <a:rPr lang="en-US" smtClean="0"/>
-              <a:t>5/17/2018</a:t>
+              <a:t>4/12/20</a:t>
             </a:fld>
             <a:endParaRPr lang="en-US"/>
           </a:p>
@@ -9738,7 +9734,7 @@
           <a:p>
             <a:fld id="{12E6D096-BE3D-0644-9615-A52293DE42F9}" type="datetimeFigureOut">
               <a:rPr lang="en-US" smtClean="0"/>
-              <a:t>5/17/2018</a:t>
+              <a:t>4/12/20</a:t>
             </a:fld>
             <a:endParaRPr lang="en-US"/>
           </a:p>
@@ -9918,7 +9914,7 @@
           <a:p>
             <a:fld id="{12E6D096-BE3D-0644-9615-A52293DE42F9}" type="datetimeFigureOut">
               <a:rPr lang="en-US" smtClean="0"/>
-              <a:t>5/17/2018</a:t>
+              <a:t>4/12/20</a:t>
             </a:fld>
             <a:endParaRPr lang="en-US"/>
           </a:p>
@@ -10088,7 +10084,7 @@
           <a:p>
             <a:fld id="{12E6D096-BE3D-0644-9615-A52293DE42F9}" type="datetimeFigureOut">
               <a:rPr lang="en-US" smtClean="0"/>
-              <a:t>5/17/2018</a:t>
+              <a:t>4/12/20</a:t>
             </a:fld>
             <a:endParaRPr lang="en-US"/>
           </a:p>
@@ -10334,7 +10330,7 @@
           <a:p>
             <a:fld id="{12E6D096-BE3D-0644-9615-A52293DE42F9}" type="datetimeFigureOut">
               <a:rPr lang="en-US" smtClean="0"/>
-              <a:t>5/17/2018</a:t>
+              <a:t>4/12/20</a:t>
             </a:fld>
             <a:endParaRPr lang="en-US"/>
           </a:p>
@@ -10566,7 +10562,7 @@
           <a:p>
             <a:fld id="{12E6D096-BE3D-0644-9615-A52293DE42F9}" type="datetimeFigureOut">
               <a:rPr lang="en-US" smtClean="0"/>
-              <a:t>5/17/2018</a:t>
+              <a:t>4/12/20</a:t>
             </a:fld>
             <a:endParaRPr lang="en-US"/>
           </a:p>
@@ -10933,7 +10929,7 @@
           <a:p>
             <a:fld id="{12E6D096-BE3D-0644-9615-A52293DE42F9}" type="datetimeFigureOut">
               <a:rPr lang="en-US" smtClean="0"/>
-              <a:t>5/17/2018</a:t>
+              <a:t>4/12/20</a:t>
             </a:fld>
             <a:endParaRPr lang="en-US"/>
           </a:p>
@@ -11051,7 +11047,7 @@
           <a:p>
             <a:fld id="{12E6D096-BE3D-0644-9615-A52293DE42F9}" type="datetimeFigureOut">
               <a:rPr lang="en-US" smtClean="0"/>
-              <a:t>5/17/2018</a:t>
+              <a:t>4/12/20</a:t>
             </a:fld>
             <a:endParaRPr lang="en-US"/>
           </a:p>
@@ -11146,7 +11142,7 @@
           <a:p>
             <a:fld id="{12E6D096-BE3D-0644-9615-A52293DE42F9}" type="datetimeFigureOut">
               <a:rPr lang="en-US" smtClean="0"/>
-              <a:t>5/17/2018</a:t>
+              <a:t>4/12/20</a:t>
             </a:fld>
             <a:endParaRPr lang="en-US"/>
           </a:p>
@@ -11423,7 +11419,7 @@
           <a:p>
             <a:fld id="{12E6D096-BE3D-0644-9615-A52293DE42F9}" type="datetimeFigureOut">
               <a:rPr lang="en-US" smtClean="0"/>
-              <a:t>5/17/2018</a:t>
+              <a:t>4/12/20</a:t>
             </a:fld>
             <a:endParaRPr lang="en-US"/>
           </a:p>
@@ -11676,7 +11672,7 @@
           <a:p>
             <a:fld id="{12E6D096-BE3D-0644-9615-A52293DE42F9}" type="datetimeFigureOut">
               <a:rPr lang="en-US" smtClean="0"/>
-              <a:t>5/17/2018</a:t>
+              <a:t>4/12/20</a:t>
             </a:fld>
             <a:endParaRPr lang="en-US"/>
           </a:p>
@@ -11889,7 +11885,7 @@
           <a:p>
             <a:fld id="{12E6D096-BE3D-0644-9615-A52293DE42F9}" type="datetimeFigureOut">
               <a:rPr lang="en-US" smtClean="0"/>
-              <a:t>5/17/2018</a:t>
+              <a:t>4/12/20</a:t>
             </a:fld>
             <a:endParaRPr lang="en-US"/>
           </a:p>
@@ -12350,94 +12346,55 @@
       </p:grpSpPr>
       <p:graphicFrame>
         <p:nvGraphicFramePr>
-          <p:cNvPr id="2" name="Table 1"/>
+          <p:cNvPr id="3" name="Table 2"/>
           <p:cNvGraphicFramePr>
             <a:graphicFrameLocks noGrp="1"/>
           </p:cNvGraphicFramePr>
           <p:nvPr>
             <p:extLst>
               <p:ext uri="{D42A27DB-BD31-4B8C-83A1-F6EECF244321}">
-                <p14:modId xmlns:p14="http://schemas.microsoft.com/office/powerpoint/2010/main" val="306229243"/>
+                <p14:modId xmlns:p14="http://schemas.microsoft.com/office/powerpoint/2010/main" val="1674408294"/>
               </p:ext>
             </p:extLst>
           </p:nvPr>
         </p:nvGraphicFramePr>
         <p:xfrm>
-          <a:off x="719849" y="719666"/>
-          <a:ext cx="11085628" cy="2701158"/>
+          <a:off x="838200" y="1825625"/>
+          <a:ext cx="7587572" cy="3073263"/>
         </p:xfrm>
         <a:graphic>
           <a:graphicData uri="http://schemas.openxmlformats.org/drawingml/2006/table">
             <a:tbl>
               <a:tblPr firstRow="1" firstCol="1" bandRow="1">
-                <a:tableStyleId>{073A0DAA-6AF3-43AB-8588-CEC1D06C72B9}</a:tableStyleId>
+                <a:tableStyleId>{5C22544A-7EE6-4342-B048-85BDC9FD1C3A}</a:tableStyleId>
               </a:tblPr>
               <a:tblGrid>
-                <a:gridCol w="1554849">
-                  <a:extLst>
-                    <a:ext uri="{9D8B030D-6E8A-4147-A177-3AD203B41FA5}">
-                      <a16:colId xmlns:a16="http://schemas.microsoft.com/office/drawing/2014/main" val="20000"/>
-                    </a:ext>
-                  </a:extLst>
-                </a:gridCol>
-                <a:gridCol w="1739329">
-                  <a:extLst>
-                    <a:ext uri="{9D8B030D-6E8A-4147-A177-3AD203B41FA5}">
-                      <a16:colId xmlns:a16="http://schemas.microsoft.com/office/drawing/2014/main" val="20001"/>
-                    </a:ext>
-                  </a:extLst>
-                </a:gridCol>
-                <a:gridCol w="1877803">
-                  <a:extLst>
-                    <a:ext uri="{9D8B030D-6E8A-4147-A177-3AD203B41FA5}">
-                      <a16:colId xmlns:a16="http://schemas.microsoft.com/office/drawing/2014/main" val="20002"/>
-                    </a:ext>
-                  </a:extLst>
-                </a:gridCol>
-                <a:gridCol w="1877803">
-                  <a:extLst>
-                    <a:ext uri="{9D8B030D-6E8A-4147-A177-3AD203B41FA5}">
-                      <a16:colId xmlns:a16="http://schemas.microsoft.com/office/drawing/2014/main" val="20003"/>
-                    </a:ext>
-                  </a:extLst>
-                </a:gridCol>
-                <a:gridCol w="2011710">
-                  <a:extLst>
-                    <a:ext uri="{9D8B030D-6E8A-4147-A177-3AD203B41FA5}">
-                      <a16:colId xmlns:a16="http://schemas.microsoft.com/office/drawing/2014/main" val="20004"/>
-                    </a:ext>
-                  </a:extLst>
-                </a:gridCol>
-                <a:gridCol w="2024134">
-                  <a:extLst>
-                    <a:ext uri="{9D8B030D-6E8A-4147-A177-3AD203B41FA5}">
-                      <a16:colId xmlns:a16="http://schemas.microsoft.com/office/drawing/2014/main" val="20005"/>
-                    </a:ext>
-                  </a:extLst>
-                </a:gridCol>
+                <a:gridCol w="2159538"/>
+                <a:gridCol w="2684834"/>
+                <a:gridCol w="2743200"/>
               </a:tblGrid>
-              <a:tr h="589416">
+              <a:tr h="277171">
                 <a:tc>
                   <a:txBody>
                     <a:bodyPr/>
                     <a:lstStyle/>
                     <a:p>
                       <a:r>
-                        <a:rPr lang="en-US" sz="1900" dirty="0" smtClean="0">
+                        <a:rPr lang="en-US" sz="2000" dirty="0" smtClean="0">
                           <a:latin typeface="Calibri" charset="0"/>
                           <a:ea typeface="Calibri" charset="0"/>
                           <a:cs typeface="Calibri" charset="0"/>
                         </a:rPr>
                         <a:t>Regression</a:t>
                       </a:r>
-                      <a:endParaRPr lang="en-US" sz="1900" dirty="0">
+                      <a:endParaRPr lang="en-US" sz="2000" dirty="0">
                         <a:latin typeface="Calibri" charset="0"/>
                         <a:ea typeface="Calibri" charset="0"/>
                         <a:cs typeface="Calibri" charset="0"/>
                       </a:endParaRPr>
                     </a:p>
                   </a:txBody>
-                  <a:tcPr marL="95953" marR="95953" marT="47976" marB="47976"/>
+                  <a:tcPr/>
                 </a:tc>
                 <a:tc>
                   <a:txBody>
@@ -12445,21 +12402,21 @@
                     <a:lstStyle/>
                     <a:p>
                       <a:r>
-                        <a:rPr lang="en-US" sz="1900" dirty="0" smtClean="0">
+                        <a:rPr lang="en-US" sz="2000" dirty="0" smtClean="0">
                           <a:latin typeface="Calibri" charset="0"/>
                           <a:ea typeface="Calibri" charset="0"/>
                           <a:cs typeface="Calibri" charset="0"/>
                         </a:rPr>
-                        <a:t>Cost Function</a:t>
+                        <a:t>Results</a:t>
                       </a:r>
-                      <a:endParaRPr lang="en-US" sz="1900" dirty="0">
+                      <a:endParaRPr lang="en-US" sz="2000" dirty="0">
                         <a:latin typeface="Calibri" charset="0"/>
                         <a:ea typeface="Calibri" charset="0"/>
                         <a:cs typeface="Calibri" charset="0"/>
                       </a:endParaRPr>
                     </a:p>
                   </a:txBody>
-                  <a:tcPr marL="95953" marR="95953" marT="47976" marB="47976"/>
+                  <a:tcPr/>
                 </a:tc>
                 <a:tc>
                   <a:txBody>
@@ -12467,206 +12424,53 @@
                     <a:lstStyle/>
                     <a:p>
                       <a:r>
-                        <a:rPr lang="en-US" sz="1900" dirty="0" smtClean="0">
+                        <a:rPr lang="en-US" sz="2000" dirty="0" smtClean="0">
                           <a:latin typeface="Calibri" charset="0"/>
                           <a:ea typeface="Calibri" charset="0"/>
                           <a:cs typeface="Calibri" charset="0"/>
                         </a:rPr>
-                        <a:t>Advantages</a:t>
+                        <a:t>Rank of</a:t>
                       </a:r>
-                      <a:endParaRPr lang="en-US" sz="1900" dirty="0">
+                      <a:r>
+                        <a:rPr lang="en-US" sz="2000" baseline="0" dirty="0" smtClean="0">
+                          <a:latin typeface="Calibri" charset="0"/>
+                          <a:ea typeface="Calibri" charset="0"/>
+                          <a:cs typeface="Calibri" charset="0"/>
+                        </a:rPr>
+                        <a:t> Performance</a:t>
+                      </a:r>
+                      <a:endParaRPr lang="en-US" sz="2000" dirty="0">
                         <a:latin typeface="Calibri" charset="0"/>
                         <a:ea typeface="Calibri" charset="0"/>
                         <a:cs typeface="Calibri" charset="0"/>
                       </a:endParaRPr>
                     </a:p>
                   </a:txBody>
-                  <a:tcPr marL="95953" marR="95953" marT="47976" marB="47976"/>
+                  <a:tcPr/>
                 </a:tc>
+              </a:tr>
+              <a:tr h="892341">
                 <a:tc>
                   <a:txBody>
                     <a:bodyPr/>
                     <a:lstStyle/>
                     <a:p>
                       <a:r>
-                        <a:rPr lang="en-US" sz="1900" dirty="0" smtClean="0">
+                        <a:rPr lang="en-US" sz="2000" dirty="0" smtClean="0">
                           <a:latin typeface="Calibri" charset="0"/>
                           <a:ea typeface="Calibri" charset="0"/>
                           <a:cs typeface="Calibri" charset="0"/>
                         </a:rPr>
-                        <a:t>Disadvantages</a:t>
+                        <a:t>Ridge</a:t>
                       </a:r>
-                      <a:endParaRPr lang="en-US" sz="1900" dirty="0">
+                      <a:endParaRPr lang="en-US" sz="2000" dirty="0">
                         <a:latin typeface="Calibri" charset="0"/>
                         <a:ea typeface="Calibri" charset="0"/>
                         <a:cs typeface="Calibri" charset="0"/>
                       </a:endParaRPr>
                     </a:p>
                   </a:txBody>
-                  <a:tcPr marL="95953" marR="95953" marT="47976" marB="47976"/>
-                </a:tc>
-                <a:tc>
-                  <a:txBody>
-                    <a:bodyPr/>
-                    <a:lstStyle/>
-                    <a:p>
-                      <a:r>
-                        <a:rPr lang="en-US" sz="1900" dirty="0" smtClean="0">
-                          <a:latin typeface="Calibri" charset="0"/>
-                          <a:ea typeface="Calibri" charset="0"/>
-                          <a:cs typeface="Calibri" charset="0"/>
-                        </a:rPr>
-                        <a:t>Results</a:t>
-                      </a:r>
-                      <a:endParaRPr lang="en-US" sz="1900" dirty="0">
-                        <a:latin typeface="Calibri" charset="0"/>
-                        <a:ea typeface="Calibri" charset="0"/>
-                        <a:cs typeface="Calibri" charset="0"/>
-                      </a:endParaRPr>
-                    </a:p>
-                  </a:txBody>
-                  <a:tcPr marL="95953" marR="95953" marT="47976" marB="47976"/>
-                </a:tc>
-                <a:tc>
-                  <a:txBody>
-                    <a:bodyPr/>
-                    <a:lstStyle/>
-                    <a:p>
-                      <a:r>
-                        <a:rPr lang="en-US" sz="1900" dirty="0" smtClean="0">
-                          <a:latin typeface="Calibri" charset="0"/>
-                          <a:ea typeface="Calibri" charset="0"/>
-                          <a:cs typeface="Calibri" charset="0"/>
-                        </a:rPr>
-                        <a:t>Rank of Performance</a:t>
-                      </a:r>
-                      <a:endParaRPr lang="en-US" sz="1900" dirty="0">
-                        <a:latin typeface="Calibri" charset="0"/>
-                        <a:ea typeface="Calibri" charset="0"/>
-                        <a:cs typeface="Calibri" charset="0"/>
-                      </a:endParaRPr>
-                    </a:p>
-                  </a:txBody>
-                  <a:tcPr marL="95953" marR="95953" marT="47976" marB="47976"/>
-                </a:tc>
-                <a:extLst>
-                  <a:ext uri="{0D108BD9-81ED-4DB2-BD59-A6C34878D82A}">
-                    <a16:rowId xmlns:a16="http://schemas.microsoft.com/office/drawing/2014/main" val="10000"/>
-                  </a:ext>
-                </a:extLst>
-              </a:tr>
-              <a:tr h="675362">
-                <a:tc>
-                  <a:txBody>
-                    <a:bodyPr/>
-                    <a:lstStyle/>
-                    <a:p>
-                      <a:r>
-                        <a:rPr lang="en-US" sz="1900" dirty="0" smtClean="0">
-                          <a:latin typeface="Calibri" charset="0"/>
-                          <a:ea typeface="Calibri" charset="0"/>
-                          <a:cs typeface="Calibri" charset="0"/>
-                        </a:rPr>
-                        <a:t>Logistic</a:t>
-                      </a:r>
-                      <a:endParaRPr lang="en-US" sz="1900" dirty="0">
-                        <a:latin typeface="Calibri" charset="0"/>
-                        <a:ea typeface="Calibri" charset="0"/>
-                        <a:cs typeface="Calibri" charset="0"/>
-                      </a:endParaRPr>
-                    </a:p>
-                  </a:txBody>
-                  <a:tcPr marL="95953" marR="95953" marT="47976" marB="47976" anchor="ctr"/>
-                </a:tc>
-                <a:tc>
-                  <a:txBody>
-                    <a:bodyPr/>
-                    <a:lstStyle/>
-                    <a:p>
-                      <a:endParaRPr lang="en-US" sz="1900" dirty="0">
-                        <a:latin typeface="Calibri" charset="0"/>
-                        <a:ea typeface="Calibri" charset="0"/>
-                        <a:cs typeface="Calibri" charset="0"/>
-                      </a:endParaRPr>
-                    </a:p>
-                  </a:txBody>
-                  <a:tcPr marL="95953" marR="95953" marT="47976" marB="47976" anchor="ctr"/>
-                </a:tc>
-                <a:tc>
-                  <a:txBody>
-                    <a:bodyPr/>
-                    <a:lstStyle/>
-                    <a:p>
-                      <a:pPr marL="0" marR="0" indent="0" algn="l" defTabSz="914400" rtl="0" eaLnBrk="1" fontAlgn="auto" latinLnBrk="0" hangingPunct="1">
-                        <a:lnSpc>
-                          <a:spcPct val="100000"/>
-                        </a:lnSpc>
-                        <a:spcBef>
-                          <a:spcPts val="0"/>
-                        </a:spcBef>
-                        <a:spcAft>
-                          <a:spcPts val="0"/>
-                        </a:spcAft>
-                        <a:buClrTx/>
-                        <a:buSzTx/>
-                        <a:buFontTx/>
-                        <a:buNone/>
-                        <a:tabLst/>
-                        <a:defRPr/>
-                      </a:pPr>
-                      <a:endParaRPr lang="en-US" sz="1900" dirty="0">
-                        <a:latin typeface="Calibri" charset="0"/>
-                        <a:ea typeface="Calibri" charset="0"/>
-                        <a:cs typeface="Calibri" charset="0"/>
-                      </a:endParaRPr>
-                    </a:p>
-                  </a:txBody>
-                  <a:tcPr marL="95953" marR="95953" marT="47976" marB="47976" anchor="ctr"/>
-                </a:tc>
-                <a:tc>
-                  <a:txBody>
-                    <a:bodyPr/>
-                    <a:lstStyle/>
-                    <a:p>
-                      <a:endParaRPr lang="en-US" sz="1900" dirty="0">
-                        <a:latin typeface="Calibri" charset="0"/>
-                        <a:ea typeface="Calibri" charset="0"/>
-                        <a:cs typeface="Calibri" charset="0"/>
-                      </a:endParaRPr>
-                    </a:p>
-                  </a:txBody>
-                  <a:tcPr marL="95953" marR="95953" marT="47976" marB="47976" anchor="ctr"/>
-                </a:tc>
-                <a:tc>
-                  <a:txBody>
-                    <a:bodyPr/>
-                    <a:lstStyle/>
-                    <a:p>
-                      <a:pPr marL="0" marR="0" indent="0" algn="l" defTabSz="914400" rtl="0" eaLnBrk="1" fontAlgn="auto" latinLnBrk="0" hangingPunct="1">
-                        <a:lnSpc>
-                          <a:spcPct val="100000"/>
-                        </a:lnSpc>
-                        <a:spcBef>
-                          <a:spcPts val="0"/>
-                        </a:spcBef>
-                        <a:spcAft>
-                          <a:spcPts val="0"/>
-                        </a:spcAft>
-                        <a:buClrTx/>
-                        <a:buSzTx/>
-                        <a:buFontTx/>
-                        <a:buNone/>
-                        <a:tabLst/>
-                        <a:defRPr/>
-                      </a:pPr>
-                      <a:endParaRPr lang="en-US" sz="1900" dirty="0" smtClean="0">
-                        <a:latin typeface="Calibri" charset="0"/>
-                        <a:ea typeface="Calibri" charset="0"/>
-                        <a:cs typeface="Calibri" charset="0"/>
-                      </a:endParaRPr>
-                    </a:p>
-                  </a:txBody>
-                  <a:tcPr marL="95953" marR="95953" marT="47976" marB="47976" anchor="ctr"/>
+                  <a:tcPr anchor="ctr"/>
                 </a:tc>
                 <a:tc>
                   <a:txBody>
@@ -12691,59 +12495,32 @@
                         <a:defRPr/>
                       </a:pPr>
                       <a:r>
-                        <a:rPr lang="en-US" sz="1900" dirty="0" smtClean="0">
+                        <a:rPr lang="en-US" sz="2000" dirty="0" smtClean="0">
                           <a:latin typeface="Calibri" charset="0"/>
                           <a:ea typeface="Calibri" charset="0"/>
                           <a:cs typeface="Calibri" charset="0"/>
                         </a:rPr>
-                        <a:t>1</a:t>
+                        <a:t>r</a:t>
                       </a:r>
-                    </a:p>
-                  </a:txBody>
-                  <a:tcPr marL="95953" marR="95953" marT="47976" marB="47976" anchor="ctr"/>
-                </a:tc>
-                <a:extLst>
-                  <a:ext uri="{0D108BD9-81ED-4DB2-BD59-A6C34878D82A}">
-                    <a16:rowId xmlns:a16="http://schemas.microsoft.com/office/drawing/2014/main" val="10001"/>
-                  </a:ext>
-                </a:extLst>
-              </a:tr>
-              <a:tr h="675362">
-                <a:tc>
-                  <a:txBody>
-                    <a:bodyPr/>
-                    <a:lstStyle/>
-                    <a:p>
                       <a:r>
-                        <a:rPr lang="en-US" sz="1900" dirty="0" smtClean="0">
+                        <a:rPr lang="en-US" sz="2000" baseline="30000" dirty="0" smtClean="0">
                           <a:latin typeface="Calibri" charset="0"/>
                           <a:ea typeface="Calibri" charset="0"/>
                           <a:cs typeface="Calibri" charset="0"/>
                         </a:rPr>
-                        <a:t>Poisson</a:t>
+                        <a:t>2</a:t>
                       </a:r>
-                      <a:endParaRPr lang="en-US" sz="1900" dirty="0">
-                        <a:latin typeface="Calibri" charset="0"/>
-                        <a:ea typeface="Calibri" charset="0"/>
-                        <a:cs typeface="Calibri" charset="0"/>
-                      </a:endParaRPr>
+                      <a:r>
+                        <a:rPr lang="en-US" sz="2000" dirty="0" smtClean="0">
+                          <a:latin typeface="Calibri" charset="0"/>
+                          <a:ea typeface="Calibri" charset="0"/>
+                          <a:cs typeface="Calibri" charset="0"/>
+                        </a:rPr>
+                        <a:t> = 0.7829</a:t>
+                      </a:r>
                     </a:p>
                   </a:txBody>
-                  <a:tcPr marL="95953" marR="95953" marT="47976" marB="47976" anchor="ctr"/>
-                </a:tc>
-                <a:tc>
-                  <a:txBody>
-                    <a:bodyPr/>
-                    <a:lstStyle/>
-                    <a:p>
-                      <a:endParaRPr lang="en-US" sz="1900" dirty="0">
-                        <a:latin typeface="Calibri" charset="0"/>
-                        <a:ea typeface="Calibri" charset="0"/>
-                        <a:cs typeface="Calibri" charset="0"/>
-                      </a:endParaRPr>
-                    </a:p>
-                  </a:txBody>
-                  <a:tcPr marL="95953" marR="95953" marT="47976" marB="47976" anchor="ctr"/>
+                  <a:tcPr anchor="ctr"/>
                 </a:tc>
                 <a:tc>
                   <a:txBody>
@@ -12767,28 +12544,84 @@
                         <a:tabLst/>
                         <a:defRPr/>
                       </a:pPr>
-                      <a:endParaRPr lang="en-US" sz="1900" dirty="0">
+                      <a:r>
+                        <a:rPr lang="en-US" sz="2000" dirty="0" smtClean="0">
+                          <a:latin typeface="Calibri" charset="0"/>
+                          <a:ea typeface="Calibri" charset="0"/>
+                          <a:cs typeface="Calibri" charset="0"/>
+                        </a:rPr>
+                        <a:t>1</a:t>
+                      </a:r>
+                      <a:endParaRPr lang="en-US" sz="2000" dirty="0" smtClean="0">
                         <a:latin typeface="Calibri" charset="0"/>
                         <a:ea typeface="Calibri" charset="0"/>
                         <a:cs typeface="Calibri" charset="0"/>
                       </a:endParaRPr>
                     </a:p>
                   </a:txBody>
-                  <a:tcPr marL="95953" marR="95953" marT="47976" marB="47976" anchor="ctr"/>
+                  <a:tcPr anchor="ctr"/>
+                </a:tc>
+              </a:tr>
+              <a:tr h="892341">
+                <a:tc>
+                  <a:txBody>
+                    <a:bodyPr/>
+                    <a:lstStyle/>
+                    <a:p>
+                      <a:r>
+                        <a:rPr lang="en-US" sz="2000" dirty="0" smtClean="0">
+                          <a:latin typeface="Calibri" charset="0"/>
+                          <a:ea typeface="Calibri" charset="0"/>
+                          <a:cs typeface="Calibri" charset="0"/>
+                        </a:rPr>
+                        <a:t>Linear (OLS)</a:t>
+                      </a:r>
+                      <a:endParaRPr lang="en-US" sz="2000" dirty="0">
+                        <a:latin typeface="Calibri" charset="0"/>
+                        <a:ea typeface="Calibri" charset="0"/>
+                        <a:cs typeface="Calibri" charset="0"/>
+                      </a:endParaRPr>
+                    </a:p>
+                  </a:txBody>
+                  <a:tcPr anchor="ctr"/>
                 </a:tc>
                 <a:tc>
                   <a:txBody>
                     <a:bodyPr/>
                     <a:lstStyle/>
                     <a:p>
-                      <a:endParaRPr lang="en-US" sz="1900" dirty="0">
+                      <a:r>
+                        <a:rPr lang="en-US" sz="2000" dirty="0" smtClean="0">
+                          <a:latin typeface="Calibri" charset="0"/>
+                          <a:ea typeface="Calibri" charset="0"/>
+                          <a:cs typeface="Calibri" charset="0"/>
+                        </a:rPr>
+                        <a:t>r</a:t>
+                      </a:r>
+                      <a:r>
+                        <a:rPr lang="en-US" sz="2000" baseline="30000" dirty="0" smtClean="0">
+                          <a:latin typeface="Calibri" charset="0"/>
+                          <a:ea typeface="Calibri" charset="0"/>
+                          <a:cs typeface="Calibri" charset="0"/>
+                        </a:rPr>
+                        <a:t>2</a:t>
+                      </a:r>
+                      <a:r>
+                        <a:rPr lang="en-US" sz="2000" dirty="0" smtClean="0">
+                          <a:latin typeface="Calibri" charset="0"/>
+                          <a:ea typeface="Calibri" charset="0"/>
+                          <a:cs typeface="Calibri" charset="0"/>
+                        </a:rPr>
+                        <a:t> = 0.7821</a:t>
+                      </a:r>
+                      <a:endParaRPr lang="en-US" sz="2000" dirty="0">
                         <a:latin typeface="Calibri" charset="0"/>
                         <a:ea typeface="Calibri" charset="0"/>
                         <a:cs typeface="Calibri" charset="0"/>
                       </a:endParaRPr>
                     </a:p>
                   </a:txBody>
-                  <a:tcPr marL="95953" marR="95953" marT="47976" marB="47976" anchor="ctr"/>
+                  <a:tcPr anchor="ctr"/>
                 </a:tc>
                 <a:tc>
                   <a:txBody>
@@ -12812,14 +12645,41 @@
                         <a:tabLst/>
                         <a:defRPr/>
                       </a:pPr>
-                      <a:endParaRPr lang="en-US" sz="1900" dirty="0" smtClean="0">
+                      <a:r>
+                        <a:rPr lang="en-US" sz="2000" dirty="0" smtClean="0">
+                          <a:latin typeface="Calibri" charset="0"/>
+                          <a:ea typeface="Calibri" charset="0"/>
+                          <a:cs typeface="Calibri" charset="0"/>
+                        </a:rPr>
+                        <a:t>2</a:t>
+                      </a:r>
+                    </a:p>
+                  </a:txBody>
+                  <a:tcPr anchor="ctr"/>
+                </a:tc>
+              </a:tr>
+              <a:tr h="892341">
+                <a:tc>
+                  <a:txBody>
+                    <a:bodyPr/>
+                    <a:lstStyle/>
+                    <a:p>
+                      <a:r>
+                        <a:rPr lang="en-US" sz="2000" dirty="0" smtClean="0">
+                          <a:latin typeface="Calibri" charset="0"/>
+                          <a:ea typeface="Calibri" charset="0"/>
+                          <a:cs typeface="Calibri" charset="0"/>
+                        </a:rPr>
+                        <a:t>Lasso</a:t>
+                      </a:r>
+                      <a:endParaRPr lang="en-US" sz="2000" dirty="0">
                         <a:latin typeface="Calibri" charset="0"/>
                         <a:ea typeface="Calibri" charset="0"/>
                         <a:cs typeface="Calibri" charset="0"/>
                       </a:endParaRPr>
                     </a:p>
                   </a:txBody>
-                  <a:tcPr marL="95953" marR="95953" marT="47976" marB="47976" anchor="ctr"/>
+                  <a:tcPr anchor="ctr"/>
                 </a:tc>
                 <a:tc>
                   <a:txBody>
@@ -12843,57 +12703,33 @@
                         <a:tabLst/>
                         <a:defRPr/>
                       </a:pPr>
-                      <a:endParaRPr lang="en-US" sz="1900" dirty="0" smtClean="0">
-                        <a:latin typeface="Calibri" charset="0"/>
-                        <a:ea typeface="Calibri" charset="0"/>
-                        <a:cs typeface="Calibri" charset="0"/>
-                      </a:endParaRPr>
-                    </a:p>
-                  </a:txBody>
-                  <a:tcPr marL="95953" marR="95953" marT="47976" marB="47976" anchor="ctr"/>
-                </a:tc>
-                <a:extLst>
-                  <a:ext uri="{0D108BD9-81ED-4DB2-BD59-A6C34878D82A}">
-                    <a16:rowId xmlns:a16="http://schemas.microsoft.com/office/drawing/2014/main" val="10002"/>
-                  </a:ext>
-                </a:extLst>
-              </a:tr>
-              <a:tr h="675362">
-                <a:tc>
-                  <a:txBody>
-                    <a:bodyPr/>
-                    <a:lstStyle/>
-                    <a:p>
                       <a:r>
-                        <a:rPr lang="en-US" sz="1900" dirty="0" smtClean="0">
+                        <a:rPr lang="en-US" sz="2000" dirty="0" smtClean="0">
                           <a:latin typeface="Calibri" charset="0"/>
                           <a:ea typeface="Calibri" charset="0"/>
                           <a:cs typeface="Calibri" charset="0"/>
                         </a:rPr>
-                        <a:t>OLS</a:t>
+                        <a:t>r</a:t>
                       </a:r>
-                      <a:endParaRPr lang="en-US" sz="1900" dirty="0">
-                        <a:latin typeface="Calibri" charset="0"/>
-                        <a:ea typeface="Calibri" charset="0"/>
-                        <a:cs typeface="Calibri" charset="0"/>
-                      </a:endParaRPr>
+                      <a:r>
+                        <a:rPr lang="en-US" sz="2000" baseline="30000" dirty="0" smtClean="0">
+                          <a:latin typeface="Calibri" charset="0"/>
+                          <a:ea typeface="Calibri" charset="0"/>
+                          <a:cs typeface="Calibri" charset="0"/>
+                        </a:rPr>
+                        <a:t>2</a:t>
+                      </a:r>
+                      <a:r>
+                        <a:rPr lang="en-US" sz="2000" dirty="0" smtClean="0">
+                          <a:latin typeface="Calibri" charset="0"/>
+                          <a:ea typeface="Calibri" charset="0"/>
+                          <a:cs typeface="Calibri" charset="0"/>
+                        </a:rPr>
+                        <a:t> = 0.7695</a:t>
+                      </a:r>
                     </a:p>
                   </a:txBody>
-                  <a:tcPr marL="95953" marR="95953" marT="47976" marB="47976" anchor="ctr"/>
-                </a:tc>
-                <a:tc>
-                  <a:txBody>
-                    <a:bodyPr/>
-                    <a:lstStyle/>
-                    <a:p>
-                      <a:endParaRPr lang="en-US" sz="1900" dirty="0">
-                        <a:latin typeface="Calibri" charset="0"/>
-                        <a:ea typeface="Calibri" charset="0"/>
-                        <a:cs typeface="Calibri" charset="0"/>
-                      </a:endParaRPr>
-                    </a:p>
-                  </a:txBody>
-                  <a:tcPr marL="95953" marR="95953" marT="47976" marB="47976" anchor="ctr"/>
+                  <a:tcPr anchor="ctr"/>
                 </a:tc>
                 <a:tc>
                   <a:txBody>
@@ -12917,96 +12753,23 @@
                         <a:tabLst/>
                         <a:defRPr/>
                       </a:pPr>
-                      <a:endParaRPr lang="en-US" sz="1900" dirty="0">
+                      <a:r>
+                        <a:rPr lang="en-US" sz="2000" dirty="0" smtClean="0">
+                          <a:latin typeface="Calibri" charset="0"/>
+                          <a:ea typeface="Calibri" charset="0"/>
+                          <a:cs typeface="Calibri" charset="0"/>
+                        </a:rPr>
+                        <a:t>3</a:t>
+                      </a:r>
+                      <a:endParaRPr lang="en-US" sz="2000" dirty="0" smtClean="0">
                         <a:latin typeface="Calibri" charset="0"/>
                         <a:ea typeface="Calibri" charset="0"/>
                         <a:cs typeface="Calibri" charset="0"/>
                       </a:endParaRPr>
                     </a:p>
                   </a:txBody>
-                  <a:tcPr marL="95953" marR="95953" marT="47976" marB="47976" anchor="ctr"/>
+                  <a:tcPr anchor="ctr"/>
                 </a:tc>
-                <a:tc>
-                  <a:txBody>
-                    <a:bodyPr/>
-                    <a:lstStyle/>
-                    <a:p>
-                      <a:endParaRPr lang="en-US" sz="1900" dirty="0">
-                        <a:latin typeface="Calibri" charset="0"/>
-                        <a:ea typeface="Calibri" charset="0"/>
-                        <a:cs typeface="Calibri" charset="0"/>
-                      </a:endParaRPr>
-                    </a:p>
-                  </a:txBody>
-                  <a:tcPr marL="95953" marR="95953" marT="47976" marB="47976" anchor="ctr"/>
-                </a:tc>
-                <a:tc>
-                  <a:txBody>
-                    <a:bodyPr/>
-                    <a:lstStyle/>
-                    <a:p>
-                      <a:pPr marL="0" marR="0" indent="0" algn="l" defTabSz="914400" rtl="0" eaLnBrk="1" fontAlgn="auto" latinLnBrk="0" hangingPunct="1">
-                        <a:lnSpc>
-                          <a:spcPct val="100000"/>
-                        </a:lnSpc>
-                        <a:spcBef>
-                          <a:spcPts val="0"/>
-                        </a:spcBef>
-                        <a:spcAft>
-                          <a:spcPts val="0"/>
-                        </a:spcAft>
-                        <a:buClrTx/>
-                        <a:buSzTx/>
-                        <a:buFontTx/>
-                        <a:buNone/>
-                        <a:tabLst/>
-                        <a:defRPr/>
-                      </a:pPr>
-                      <a:endParaRPr lang="en-US" sz="1900" dirty="0" smtClean="0">
-                        <a:latin typeface="Calibri" charset="0"/>
-                        <a:ea typeface="Calibri" charset="0"/>
-                        <a:cs typeface="Calibri" charset="0"/>
-                      </a:endParaRPr>
-                    </a:p>
-                  </a:txBody>
-                  <a:tcPr marL="95953" marR="95953" marT="47976" marB="47976" anchor="ctr"/>
-                </a:tc>
-                <a:tc>
-                  <a:txBody>
-                    <a:bodyPr/>
-                    <a:lstStyle/>
-                    <a:p>
-                      <a:pPr marL="0" marR="0" indent="0" algn="l" defTabSz="914400" rtl="0" eaLnBrk="1" fontAlgn="auto" latinLnBrk="0" hangingPunct="1">
-                        <a:lnSpc>
-                          <a:spcPct val="100000"/>
-                        </a:lnSpc>
-                        <a:spcBef>
-                          <a:spcPts val="0"/>
-                        </a:spcBef>
-                        <a:spcAft>
-                          <a:spcPts val="0"/>
-                        </a:spcAft>
-                        <a:buClrTx/>
-                        <a:buSzTx/>
-                        <a:buFontTx/>
-                        <a:buNone/>
-                        <a:tabLst/>
-                        <a:defRPr/>
-                      </a:pPr>
-                      <a:endParaRPr lang="en-US" sz="1900" dirty="0" smtClean="0">
-                        <a:latin typeface="Calibri" charset="0"/>
-                        <a:ea typeface="Calibri" charset="0"/>
-                        <a:cs typeface="Calibri" charset="0"/>
-                      </a:endParaRPr>
-                    </a:p>
-                  </a:txBody>
-                  <a:tcPr marL="95953" marR="95953" marT="47976" marB="47976" anchor="ctr"/>
-                </a:tc>
-                <a:extLst>
-                  <a:ext uri="{0D108BD9-81ED-4DB2-BD59-A6C34878D82A}">
-                    <a16:rowId xmlns:a16="http://schemas.microsoft.com/office/drawing/2014/main" val="10003"/>
-                  </a:ext>
-                </a:extLst>
               </a:tr>
             </a:tbl>
           </a:graphicData>
@@ -13044,20 +12807,20 @@
       </p:grpSpPr>
       <p:graphicFrame>
         <p:nvGraphicFramePr>
-          <p:cNvPr id="5" name="Chart 4"/>
+          <p:cNvPr id="3" name="Chart 2"/>
           <p:cNvGraphicFramePr>
             <a:graphicFrameLocks/>
           </p:cNvGraphicFramePr>
           <p:nvPr>
             <p:extLst>
               <p:ext uri="{D42A27DB-BD31-4B8C-83A1-F6EECF244321}">
-                <p14:modId xmlns:p14="http://schemas.microsoft.com/office/powerpoint/2010/main" val="1619328679"/>
+                <p14:modId xmlns:p14="http://schemas.microsoft.com/office/powerpoint/2010/main" val="602779259"/>
               </p:ext>
             </p:extLst>
           </p:nvPr>
         </p:nvGraphicFramePr>
         <p:xfrm>
-          <a:off x="2518833" y="1282700"/>
+          <a:off x="2518833" y="1033318"/>
           <a:ext cx="7154333" cy="4292600"/>
         </p:xfrm>
         <a:graphic>
@@ -13394,28 +13157,28 @@
                 <a:gridCol w="2159538">
                   <a:extLst>
                     <a:ext uri="{9D8B030D-6E8A-4147-A177-3AD203B41FA5}">
-                      <a16:colId xmlns:a16="http://schemas.microsoft.com/office/drawing/2014/main" val="20000"/>
+                      <a16:colId xmlns:a16="http://schemas.microsoft.com/office/drawing/2014/main" xmlns="" val="20000"/>
                     </a:ext>
                   </a:extLst>
                 </a:gridCol>
                 <a:gridCol w="2684834">
                   <a:extLst>
                     <a:ext uri="{9D8B030D-6E8A-4147-A177-3AD203B41FA5}">
-                      <a16:colId xmlns:a16="http://schemas.microsoft.com/office/drawing/2014/main" val="20001"/>
+                      <a16:colId xmlns:a16="http://schemas.microsoft.com/office/drawing/2014/main" xmlns="" val="20001"/>
                     </a:ext>
                   </a:extLst>
                 </a:gridCol>
                 <a:gridCol w="2743200">
                   <a:extLst>
                     <a:ext uri="{9D8B030D-6E8A-4147-A177-3AD203B41FA5}">
-                      <a16:colId xmlns:a16="http://schemas.microsoft.com/office/drawing/2014/main" val="20002"/>
+                      <a16:colId xmlns:a16="http://schemas.microsoft.com/office/drawing/2014/main" xmlns="" val="20002"/>
                     </a:ext>
                   </a:extLst>
                 </a:gridCol>
                 <a:gridCol w="2976664">
                   <a:extLst>
                     <a:ext uri="{9D8B030D-6E8A-4147-A177-3AD203B41FA5}">
-                      <a16:colId xmlns:a16="http://schemas.microsoft.com/office/drawing/2014/main" val="20003"/>
+                      <a16:colId xmlns:a16="http://schemas.microsoft.com/office/drawing/2014/main" xmlns="" val="20003"/>
                     </a:ext>
                   </a:extLst>
                 </a:gridCol>
@@ -13511,7 +13274,7 @@
                 </a:tc>
                 <a:extLst>
                   <a:ext uri="{0D108BD9-81ED-4DB2-BD59-A6C34878D82A}">
-                    <a16:rowId xmlns:a16="http://schemas.microsoft.com/office/drawing/2014/main" val="10000"/>
+                    <a16:rowId xmlns:a16="http://schemas.microsoft.com/office/drawing/2014/main" xmlns="" val="10000"/>
                   </a:ext>
                 </a:extLst>
               </a:tr>
@@ -13643,7 +13406,7 @@
                 </a:tc>
                 <a:extLst>
                   <a:ext uri="{0D108BD9-81ED-4DB2-BD59-A6C34878D82A}">
-                    <a16:rowId xmlns:a16="http://schemas.microsoft.com/office/drawing/2014/main" val="10001"/>
+                    <a16:rowId xmlns:a16="http://schemas.microsoft.com/office/drawing/2014/main" xmlns="" val="10001"/>
                   </a:ext>
                 </a:extLst>
               </a:tr>
@@ -13722,7 +13485,7 @@
                 </a:tc>
                 <a:extLst>
                   <a:ext uri="{0D108BD9-81ED-4DB2-BD59-A6C34878D82A}">
-                    <a16:rowId xmlns:a16="http://schemas.microsoft.com/office/drawing/2014/main" val="10002"/>
+                    <a16:rowId xmlns:a16="http://schemas.microsoft.com/office/drawing/2014/main" xmlns="" val="10002"/>
                   </a:ext>
                 </a:extLst>
               </a:tr>
@@ -13835,7 +13598,7 @@
                 </a:tc>
                 <a:extLst>
                   <a:ext uri="{0D108BD9-81ED-4DB2-BD59-A6C34878D82A}">
-                    <a16:rowId xmlns:a16="http://schemas.microsoft.com/office/drawing/2014/main" val="10003"/>
+                    <a16:rowId xmlns:a16="http://schemas.microsoft.com/office/drawing/2014/main" xmlns="" val="10003"/>
                   </a:ext>
                 </a:extLst>
               </a:tr>
@@ -13943,7 +13706,7 @@
                 </a:tc>
                 <a:extLst>
                   <a:ext uri="{0D108BD9-81ED-4DB2-BD59-A6C34878D82A}">
-                    <a16:rowId xmlns:a16="http://schemas.microsoft.com/office/drawing/2014/main" val="10004"/>
+                    <a16:rowId xmlns:a16="http://schemas.microsoft.com/office/drawing/2014/main" xmlns="" val="10004"/>
                   </a:ext>
                 </a:extLst>
               </a:tr>
@@ -14114,7 +13877,7 @@
                 </a:tc>
                 <a:extLst>
                   <a:ext uri="{0D108BD9-81ED-4DB2-BD59-A6C34878D82A}">
-                    <a16:rowId xmlns:a16="http://schemas.microsoft.com/office/drawing/2014/main" val="10005"/>
+                    <a16:rowId xmlns:a16="http://schemas.microsoft.com/office/drawing/2014/main" xmlns="" val="10005"/>
                   </a:ext>
                 </a:extLst>
               </a:tr>
@@ -14235,7 +13998,7 @@
                 </a:tc>
                 <a:extLst>
                   <a:ext uri="{0D108BD9-81ED-4DB2-BD59-A6C34878D82A}">
-                    <a16:rowId xmlns:a16="http://schemas.microsoft.com/office/drawing/2014/main" val="10006"/>
+                    <a16:rowId xmlns:a16="http://schemas.microsoft.com/office/drawing/2014/main" xmlns="" val="10006"/>
                   </a:ext>
                 </a:extLst>
               </a:tr>
@@ -14348,7 +14111,7 @@
                 </a:tc>
                 <a:extLst>
                   <a:ext uri="{0D108BD9-81ED-4DB2-BD59-A6C34878D82A}">
-                    <a16:rowId xmlns:a16="http://schemas.microsoft.com/office/drawing/2014/main" val="10007"/>
+                    <a16:rowId xmlns:a16="http://schemas.microsoft.com/office/drawing/2014/main" xmlns="" val="10007"/>
                   </a:ext>
                 </a:extLst>
               </a:tr>
@@ -14461,7 +14224,7 @@
                 </a:tc>
                 <a:extLst>
                   <a:ext uri="{0D108BD9-81ED-4DB2-BD59-A6C34878D82A}">
-                    <a16:rowId xmlns:a16="http://schemas.microsoft.com/office/drawing/2014/main" val="10008"/>
+                    <a16:rowId xmlns:a16="http://schemas.microsoft.com/office/drawing/2014/main" xmlns="" val="10008"/>
                   </a:ext>
                 </a:extLst>
               </a:tr>
@@ -14551,15 +14314,7 @@
                           <a:ea typeface="Calibri" charset="0"/>
                           <a:cs typeface="Calibri" charset="0"/>
                         </a:rPr>
-                        <a:t>Middle </a:t>
-                      </a:r>
-                      <a:r>
-                        <a:rPr lang="en-US" dirty="0" smtClean="0">
-                          <a:latin typeface="Calibri" charset="0"/>
-                          <a:ea typeface="Calibri" charset="0"/>
-                          <a:cs typeface="Calibri" charset="0"/>
-                        </a:rPr>
-                        <a:t>priority</a:t>
+                        <a:t>Middle priority</a:t>
                       </a:r>
                       <a:endParaRPr lang="en-US" dirty="0">
                         <a:latin typeface="Calibri" charset="0"/>
@@ -14572,7 +14327,7 @@
                 </a:tc>
                 <a:extLst>
                   <a:ext uri="{0D108BD9-81ED-4DB2-BD59-A6C34878D82A}">
-                    <a16:rowId xmlns:a16="http://schemas.microsoft.com/office/drawing/2014/main" val="10009"/>
+                    <a16:rowId xmlns:a16="http://schemas.microsoft.com/office/drawing/2014/main" xmlns="" val="10009"/>
                   </a:ext>
                 </a:extLst>
               </a:tr>
@@ -14651,7 +14406,7 @@
                 </a:tc>
                 <a:extLst>
                   <a:ext uri="{0D108BD9-81ED-4DB2-BD59-A6C34878D82A}">
-                    <a16:rowId xmlns:a16="http://schemas.microsoft.com/office/drawing/2014/main" val="10010"/>
+                    <a16:rowId xmlns:a16="http://schemas.microsoft.com/office/drawing/2014/main" xmlns="" val="10010"/>
                   </a:ext>
                 </a:extLst>
               </a:tr>
@@ -14717,15 +14472,7 @@
                           <a:ea typeface="Calibri" charset="0"/>
                           <a:cs typeface="Calibri" charset="0"/>
                         </a:rPr>
-                        <a:t>Lowest </a:t>
-                      </a:r>
-                      <a:r>
-                        <a:rPr lang="en-US" baseline="0" dirty="0" smtClean="0">
-                          <a:latin typeface="Calibri" charset="0"/>
-                          <a:ea typeface="Calibri" charset="0"/>
-                          <a:cs typeface="Calibri" charset="0"/>
-                        </a:rPr>
-                        <a:t>priority</a:t>
+                        <a:t>Lowest priority</a:t>
                       </a:r>
                       <a:endParaRPr lang="en-US" dirty="0">
                         <a:latin typeface="Calibri" charset="0"/>
@@ -14738,7 +14485,7 @@
                 </a:tc>
                 <a:extLst>
                   <a:ext uri="{0D108BD9-81ED-4DB2-BD59-A6C34878D82A}">
-                    <a16:rowId xmlns:a16="http://schemas.microsoft.com/office/drawing/2014/main" val="10011"/>
+                    <a16:rowId xmlns:a16="http://schemas.microsoft.com/office/drawing/2014/main" xmlns="" val="10011"/>
                   </a:ext>
                 </a:extLst>
               </a:tr>
@@ -14804,28 +14551,28 @@
                 <a:gridCol w="2286539">
                   <a:extLst>
                     <a:ext uri="{9D8B030D-6E8A-4147-A177-3AD203B41FA5}">
-                      <a16:colId xmlns:a16="http://schemas.microsoft.com/office/drawing/2014/main" val="20000"/>
+                      <a16:colId xmlns:a16="http://schemas.microsoft.com/office/drawing/2014/main" xmlns="" val="20000"/>
                     </a:ext>
                   </a:extLst>
                 </a:gridCol>
                 <a:gridCol w="2557833">
                   <a:extLst>
                     <a:ext uri="{9D8B030D-6E8A-4147-A177-3AD203B41FA5}">
-                      <a16:colId xmlns:a16="http://schemas.microsoft.com/office/drawing/2014/main" val="20001"/>
+                      <a16:colId xmlns:a16="http://schemas.microsoft.com/office/drawing/2014/main" xmlns="" val="20001"/>
                     </a:ext>
                   </a:extLst>
                 </a:gridCol>
                 <a:gridCol w="2743200">
                   <a:extLst>
                     <a:ext uri="{9D8B030D-6E8A-4147-A177-3AD203B41FA5}">
-                      <a16:colId xmlns:a16="http://schemas.microsoft.com/office/drawing/2014/main" val="20002"/>
+                      <a16:colId xmlns:a16="http://schemas.microsoft.com/office/drawing/2014/main" xmlns="" val="20002"/>
                     </a:ext>
                   </a:extLst>
                 </a:gridCol>
                 <a:gridCol w="2976664">
                   <a:extLst>
                     <a:ext uri="{9D8B030D-6E8A-4147-A177-3AD203B41FA5}">
-                      <a16:colId xmlns:a16="http://schemas.microsoft.com/office/drawing/2014/main" val="20003"/>
+                      <a16:colId xmlns:a16="http://schemas.microsoft.com/office/drawing/2014/main" xmlns="" val="20003"/>
                     </a:ext>
                   </a:extLst>
                 </a:gridCol>
@@ -14905,7 +14652,7 @@
                 </a:tc>
                 <a:extLst>
                   <a:ext uri="{0D108BD9-81ED-4DB2-BD59-A6C34878D82A}">
-                    <a16:rowId xmlns:a16="http://schemas.microsoft.com/office/drawing/2014/main" val="10000"/>
+                    <a16:rowId xmlns:a16="http://schemas.microsoft.com/office/drawing/2014/main" xmlns="" val="10000"/>
                   </a:ext>
                 </a:extLst>
               </a:tr>
@@ -15022,7 +14769,7 @@
                 </a:tc>
                 <a:extLst>
                   <a:ext uri="{0D108BD9-81ED-4DB2-BD59-A6C34878D82A}">
-                    <a16:rowId xmlns:a16="http://schemas.microsoft.com/office/drawing/2014/main" val="10001"/>
+                    <a16:rowId xmlns:a16="http://schemas.microsoft.com/office/drawing/2014/main" xmlns="" val="10001"/>
                   </a:ext>
                 </a:extLst>
               </a:tr>
@@ -15073,7 +14820,7 @@
                 </a:tc>
                 <a:extLst>
                   <a:ext uri="{0D108BD9-81ED-4DB2-BD59-A6C34878D82A}">
-                    <a16:rowId xmlns:a16="http://schemas.microsoft.com/office/drawing/2014/main" val="10002"/>
+                    <a16:rowId xmlns:a16="http://schemas.microsoft.com/office/drawing/2014/main" xmlns="" val="10002"/>
                   </a:ext>
                 </a:extLst>
               </a:tr>
@@ -15124,7 +14871,7 @@
                 </a:tc>
                 <a:extLst>
                   <a:ext uri="{0D108BD9-81ED-4DB2-BD59-A6C34878D82A}">
-                    <a16:rowId xmlns:a16="http://schemas.microsoft.com/office/drawing/2014/main" val="10003"/>
+                    <a16:rowId xmlns:a16="http://schemas.microsoft.com/office/drawing/2014/main" xmlns="" val="10003"/>
                   </a:ext>
                 </a:extLst>
               </a:tr>
@@ -15179,7 +14926,7 @@
                 </a:tc>
                 <a:extLst>
                   <a:ext uri="{0D108BD9-81ED-4DB2-BD59-A6C34878D82A}">
-                    <a16:rowId xmlns:a16="http://schemas.microsoft.com/office/drawing/2014/main" val="10004"/>
+                    <a16:rowId xmlns:a16="http://schemas.microsoft.com/office/drawing/2014/main" xmlns="" val="10004"/>
                   </a:ext>
                 </a:extLst>
               </a:tr>

</xml_diff>